<commit_message>
finalise example test project, finalise presentation
</commit_message>
<xml_diff>
--- a/tapost-2015-accessibility.pptx
+++ b/tapost-2015-accessibility.pptx
@@ -5,7 +5,7 @@
     <p:sldMasterId id="2147483720" r:id="rId1"/>
   </p:sldMasterIdLst>
   <p:notesMasterIdLst>
-    <p:notesMasterId r:id="rId13"/>
+    <p:notesMasterId r:id="rId20"/>
   </p:notesMasterIdLst>
   <p:sldIdLst>
     <p:sldId id="256" r:id="rId2"/>
@@ -19,6 +19,13 @@
     <p:sldId id="262" r:id="rId10"/>
     <p:sldId id="265" r:id="rId11"/>
     <p:sldId id="266" r:id="rId12"/>
+    <p:sldId id="267" r:id="rId13"/>
+    <p:sldId id="268" r:id="rId14"/>
+    <p:sldId id="269" r:id="rId15"/>
+    <p:sldId id="270" r:id="rId16"/>
+    <p:sldId id="271" r:id="rId17"/>
+    <p:sldId id="272" r:id="rId18"/>
+    <p:sldId id="273" r:id="rId19"/>
   </p:sldIdLst>
   <p:sldSz cx="9144000" cy="6858000" type="screen4x3"/>
   <p:notesSz cx="6858000" cy="9144000"/>
@@ -129,7 +136,7 @@
             <p14:sldId id="260"/>
           </p14:sldIdLst>
         </p14:section>
-        <p14:section name="Implementation" id="{DADDFA4D-1137-46BA-A284-4BB4D6C269AA}">
+        <p14:section name="Strategy" id="{DADDFA4D-1137-46BA-A284-4BB4D6C269AA}">
           <p14:sldIdLst>
             <p14:sldId id="261"/>
             <p14:sldId id="263"/>
@@ -137,6 +144,25 @@
             <p14:sldId id="262"/>
             <p14:sldId id="265"/>
             <p14:sldId id="266"/>
+          </p14:sldIdLst>
+        </p14:section>
+        <p14:section name="Implementation" id="{66E51A05-91F8-49FA-9A9F-CF79C1D55D2F}">
+          <p14:sldIdLst>
+            <p14:sldId id="267"/>
+            <p14:sldId id="268"/>
+            <p14:sldId id="269"/>
+            <p14:sldId id="270"/>
+            <p14:sldId id="271"/>
+          </p14:sldIdLst>
+        </p14:section>
+        <p14:section name="Demo" id="{D7AFA0BE-1391-4D15-86AB-CC9F25FE40D7}">
+          <p14:sldIdLst>
+            <p14:sldId id="272"/>
+          </p14:sldIdLst>
+        </p14:section>
+        <p14:section name="Outro" id="{D4F02315-3FEF-4F60-A099-DC3CD310B4CD}">
+          <p14:sldIdLst>
+            <p14:sldId id="273"/>
           </p14:sldIdLst>
         </p14:section>
       </p14:sectionLst>
@@ -227,7 +253,7 @@
           <a:p>
             <a:fld id="{1B03F053-8623-4588-BFE3-0CCB054F7318}" type="datetimeFigureOut">
               <a:rPr lang="en-GB" smtClean="0"/>
-              <a:t>21/09/2015</a:t>
+              <a:t>01/10/2015</a:t>
             </a:fld>
             <a:endParaRPr lang="en-GB"/>
           </a:p>
@@ -627,6 +653,10 @@
           <a:bodyPr/>
           <a:lstStyle/>
           <a:p>
+            <a:r>
+              <a:rPr lang="en-GB" sz="1200" dirty="0" smtClean="0"/>
+              <a:t>What we need from Scala</a:t>
+            </a:r>
             <a:endParaRPr lang="en-GB" dirty="0"/>
           </a:p>
         </p:txBody>
@@ -711,6 +741,10 @@
           <a:bodyPr/>
           <a:lstStyle/>
           <a:p>
+            <a:r>
+              <a:rPr lang="en-GB" sz="1200" dirty="0" smtClean="0"/>
+              <a:t>What we need from Cucumber</a:t>
+            </a:r>
             <a:endParaRPr lang="en-GB" dirty="0"/>
           </a:p>
         </p:txBody>
@@ -733,6 +767,634 @@
             <a:fld id="{D0D72174-1E0F-4850-B29D-2C161ABE5122}" type="slidenum">
               <a:rPr lang="en-GB" smtClean="0"/>
               <a:t>11</a:t>
+            </a:fld>
+            <a:endParaRPr lang="en-GB"/>
+          </a:p>
+        </p:txBody>
+      </p:sp>
+    </p:spTree>
+    <p:extLst>
+      <p:ext uri="{BB962C8B-B14F-4D97-AF65-F5344CB8AC3E}">
+        <p14:creationId xmlns:p14="http://schemas.microsoft.com/office/powerpoint/2010/main" val="1036251049"/>
+      </p:ext>
+    </p:extLst>
+  </p:cSld>
+  <p:clrMapOvr>
+    <a:masterClrMapping/>
+  </p:clrMapOvr>
+</p:notes>
+</file>
+
+<file path=ppt/notesSlides/notesSlide12.xml><?xml version="1.0" encoding="utf-8"?>
+<p:notes xmlns:a="http://schemas.openxmlformats.org/drawingml/2006/main" xmlns:r="http://schemas.openxmlformats.org/officeDocument/2006/relationships" xmlns:p="http://schemas.openxmlformats.org/presentationml/2006/main">
+  <p:cSld>
+    <p:spTree>
+      <p:nvGrpSpPr>
+        <p:cNvPr id="1" name=""/>
+        <p:cNvGrpSpPr/>
+        <p:nvPr/>
+      </p:nvGrpSpPr>
+      <p:grpSpPr>
+        <a:xfrm>
+          <a:off x="0" y="0"/>
+          <a:ext cx="0" cy="0"/>
+          <a:chOff x="0" y="0"/>
+          <a:chExt cx="0" cy="0"/>
+        </a:xfrm>
+      </p:grpSpPr>
+      <p:sp>
+        <p:nvSpPr>
+          <p:cNvPr id="2" name="Slide Image Placeholder 1"/>
+          <p:cNvSpPr>
+            <a:spLocks noGrp="1" noRot="1" noChangeAspect="1"/>
+          </p:cNvSpPr>
+          <p:nvPr>
+            <p:ph type="sldImg"/>
+          </p:nvPr>
+        </p:nvSpPr>
+        <p:spPr/>
+      </p:sp>
+      <p:sp>
+        <p:nvSpPr>
+          <p:cNvPr id="3" name="Notes Placeholder 2"/>
+          <p:cNvSpPr>
+            <a:spLocks noGrp="1"/>
+          </p:cNvSpPr>
+          <p:nvPr>
+            <p:ph type="body" idx="1"/>
+          </p:nvPr>
+        </p:nvSpPr>
+        <p:spPr/>
+        <p:txBody>
+          <a:bodyPr/>
+          <a:lstStyle/>
+          <a:p>
+            <a:r>
+              <a:rPr lang="en-GB" sz="1200" dirty="0" smtClean="0"/>
+              <a:t>Checklist for Implementation</a:t>
+            </a:r>
+            <a:endParaRPr lang="en-GB" dirty="0"/>
+          </a:p>
+        </p:txBody>
+      </p:sp>
+      <p:sp>
+        <p:nvSpPr>
+          <p:cNvPr id="4" name="Slide Number Placeholder 3"/>
+          <p:cNvSpPr>
+            <a:spLocks noGrp="1"/>
+          </p:cNvSpPr>
+          <p:nvPr>
+            <p:ph type="sldNum" sz="quarter" idx="10"/>
+          </p:nvPr>
+        </p:nvSpPr>
+        <p:spPr/>
+        <p:txBody>
+          <a:bodyPr/>
+          <a:lstStyle/>
+          <a:p>
+            <a:fld id="{D0D72174-1E0F-4850-B29D-2C161ABE5122}" type="slidenum">
+              <a:rPr lang="en-GB" smtClean="0"/>
+              <a:t>12</a:t>
+            </a:fld>
+            <a:endParaRPr lang="en-GB"/>
+          </a:p>
+        </p:txBody>
+      </p:sp>
+    </p:spTree>
+    <p:extLst>
+      <p:ext uri="{BB962C8B-B14F-4D97-AF65-F5344CB8AC3E}">
+        <p14:creationId xmlns:p14="http://schemas.microsoft.com/office/powerpoint/2010/main" val="1036251049"/>
+      </p:ext>
+    </p:extLst>
+  </p:cSld>
+  <p:clrMapOvr>
+    <a:masterClrMapping/>
+  </p:clrMapOvr>
+</p:notes>
+</file>
+
+<file path=ppt/notesSlides/notesSlide13.xml><?xml version="1.0" encoding="utf-8"?>
+<p:notes xmlns:a="http://schemas.openxmlformats.org/drawingml/2006/main" xmlns:r="http://schemas.openxmlformats.org/officeDocument/2006/relationships" xmlns:p="http://schemas.openxmlformats.org/presentationml/2006/main">
+  <p:cSld>
+    <p:spTree>
+      <p:nvGrpSpPr>
+        <p:cNvPr id="1" name=""/>
+        <p:cNvGrpSpPr/>
+        <p:nvPr/>
+      </p:nvGrpSpPr>
+      <p:grpSpPr>
+        <a:xfrm>
+          <a:off x="0" y="0"/>
+          <a:ext cx="0" cy="0"/>
+          <a:chOff x="0" y="0"/>
+          <a:chExt cx="0" cy="0"/>
+        </a:xfrm>
+      </p:grpSpPr>
+      <p:sp>
+        <p:nvSpPr>
+          <p:cNvPr id="2" name="Slide Image Placeholder 1"/>
+          <p:cNvSpPr>
+            <a:spLocks noGrp="1" noRot="1" noChangeAspect="1"/>
+          </p:cNvSpPr>
+          <p:nvPr>
+            <p:ph type="sldImg"/>
+          </p:nvPr>
+        </p:nvSpPr>
+        <p:spPr/>
+      </p:sp>
+      <p:sp>
+        <p:nvSpPr>
+          <p:cNvPr id="3" name="Notes Placeholder 2"/>
+          <p:cNvSpPr>
+            <a:spLocks noGrp="1"/>
+          </p:cNvSpPr>
+          <p:nvPr>
+            <p:ph type="body" idx="1"/>
+          </p:nvPr>
+        </p:nvSpPr>
+        <p:spPr/>
+        <p:txBody>
+          <a:bodyPr/>
+          <a:lstStyle/>
+          <a:p>
+            <a:r>
+              <a:rPr lang="en-GB" sz="1200" dirty="0" smtClean="0"/>
+              <a:t>User journey</a:t>
+            </a:r>
+            <a:endParaRPr lang="en-GB" dirty="0"/>
+          </a:p>
+        </p:txBody>
+      </p:sp>
+      <p:sp>
+        <p:nvSpPr>
+          <p:cNvPr id="4" name="Slide Number Placeholder 3"/>
+          <p:cNvSpPr>
+            <a:spLocks noGrp="1"/>
+          </p:cNvSpPr>
+          <p:nvPr>
+            <p:ph type="sldNum" sz="quarter" idx="10"/>
+          </p:nvPr>
+        </p:nvSpPr>
+        <p:spPr/>
+        <p:txBody>
+          <a:bodyPr/>
+          <a:lstStyle/>
+          <a:p>
+            <a:fld id="{D0D72174-1E0F-4850-B29D-2C161ABE5122}" type="slidenum">
+              <a:rPr lang="en-GB" smtClean="0"/>
+              <a:t>13</a:t>
+            </a:fld>
+            <a:endParaRPr lang="en-GB"/>
+          </a:p>
+        </p:txBody>
+      </p:sp>
+    </p:spTree>
+    <p:extLst>
+      <p:ext uri="{BB962C8B-B14F-4D97-AF65-F5344CB8AC3E}">
+        <p14:creationId xmlns:p14="http://schemas.microsoft.com/office/powerpoint/2010/main" val="1036251049"/>
+      </p:ext>
+    </p:extLst>
+  </p:cSld>
+  <p:clrMapOvr>
+    <a:masterClrMapping/>
+  </p:clrMapOvr>
+</p:notes>
+</file>
+
+<file path=ppt/notesSlides/notesSlide14.xml><?xml version="1.0" encoding="utf-8"?>
+<p:notes xmlns:a="http://schemas.openxmlformats.org/drawingml/2006/main" xmlns:r="http://schemas.openxmlformats.org/officeDocument/2006/relationships" xmlns:p="http://schemas.openxmlformats.org/presentationml/2006/main">
+  <p:cSld>
+    <p:spTree>
+      <p:nvGrpSpPr>
+        <p:cNvPr id="1" name=""/>
+        <p:cNvGrpSpPr/>
+        <p:nvPr/>
+      </p:nvGrpSpPr>
+      <p:grpSpPr>
+        <a:xfrm>
+          <a:off x="0" y="0"/>
+          <a:ext cx="0" cy="0"/>
+          <a:chOff x="0" y="0"/>
+          <a:chExt cx="0" cy="0"/>
+        </a:xfrm>
+      </p:grpSpPr>
+      <p:sp>
+        <p:nvSpPr>
+          <p:cNvPr id="2" name="Slide Image Placeholder 1"/>
+          <p:cNvSpPr>
+            <a:spLocks noGrp="1" noRot="1" noChangeAspect="1"/>
+          </p:cNvSpPr>
+          <p:nvPr>
+            <p:ph type="sldImg"/>
+          </p:nvPr>
+        </p:nvSpPr>
+        <p:spPr/>
+      </p:sp>
+      <p:sp>
+        <p:nvSpPr>
+          <p:cNvPr id="3" name="Notes Placeholder 2"/>
+          <p:cNvSpPr>
+            <a:spLocks noGrp="1"/>
+          </p:cNvSpPr>
+          <p:nvPr>
+            <p:ph type="body" idx="1"/>
+          </p:nvPr>
+        </p:nvSpPr>
+        <p:spPr/>
+        <p:txBody>
+          <a:bodyPr/>
+          <a:lstStyle/>
+          <a:p>
+            <a:r>
+              <a:rPr lang="en-GB" sz="1200" dirty="0" smtClean="0"/>
+              <a:t>Code for journey</a:t>
+            </a:r>
+            <a:endParaRPr lang="en-GB" dirty="0"/>
+          </a:p>
+        </p:txBody>
+      </p:sp>
+      <p:sp>
+        <p:nvSpPr>
+          <p:cNvPr id="4" name="Slide Number Placeholder 3"/>
+          <p:cNvSpPr>
+            <a:spLocks noGrp="1"/>
+          </p:cNvSpPr>
+          <p:nvPr>
+            <p:ph type="sldNum" sz="quarter" idx="10"/>
+          </p:nvPr>
+        </p:nvSpPr>
+        <p:spPr/>
+        <p:txBody>
+          <a:bodyPr/>
+          <a:lstStyle/>
+          <a:p>
+            <a:fld id="{D0D72174-1E0F-4850-B29D-2C161ABE5122}" type="slidenum">
+              <a:rPr lang="en-GB" smtClean="0"/>
+              <a:t>14</a:t>
+            </a:fld>
+            <a:endParaRPr lang="en-GB"/>
+          </a:p>
+        </p:txBody>
+      </p:sp>
+    </p:spTree>
+    <p:extLst>
+      <p:ext uri="{BB962C8B-B14F-4D97-AF65-F5344CB8AC3E}">
+        <p14:creationId xmlns:p14="http://schemas.microsoft.com/office/powerpoint/2010/main" val="1036251049"/>
+      </p:ext>
+    </p:extLst>
+  </p:cSld>
+  <p:clrMapOvr>
+    <a:masterClrMapping/>
+  </p:clrMapOvr>
+</p:notes>
+</file>
+
+<file path=ppt/notesSlides/notesSlide15.xml><?xml version="1.0" encoding="utf-8"?>
+<p:notes xmlns:a="http://schemas.openxmlformats.org/drawingml/2006/main" xmlns:r="http://schemas.openxmlformats.org/officeDocument/2006/relationships" xmlns:p="http://schemas.openxmlformats.org/presentationml/2006/main">
+  <p:cSld>
+    <p:spTree>
+      <p:nvGrpSpPr>
+        <p:cNvPr id="1" name=""/>
+        <p:cNvGrpSpPr/>
+        <p:nvPr/>
+      </p:nvGrpSpPr>
+      <p:grpSpPr>
+        <a:xfrm>
+          <a:off x="0" y="0"/>
+          <a:ext cx="0" cy="0"/>
+          <a:chOff x="0" y="0"/>
+          <a:chExt cx="0" cy="0"/>
+        </a:xfrm>
+      </p:grpSpPr>
+      <p:sp>
+        <p:nvSpPr>
+          <p:cNvPr id="2" name="Slide Image Placeholder 1"/>
+          <p:cNvSpPr>
+            <a:spLocks noGrp="1" noRot="1" noChangeAspect="1"/>
+          </p:cNvSpPr>
+          <p:nvPr>
+            <p:ph type="sldImg"/>
+          </p:nvPr>
+        </p:nvSpPr>
+        <p:spPr/>
+      </p:sp>
+      <p:sp>
+        <p:nvSpPr>
+          <p:cNvPr id="3" name="Notes Placeholder 2"/>
+          <p:cNvSpPr>
+            <a:spLocks noGrp="1"/>
+          </p:cNvSpPr>
+          <p:nvPr>
+            <p:ph type="body" idx="1"/>
+          </p:nvPr>
+        </p:nvSpPr>
+        <p:spPr/>
+        <p:txBody>
+          <a:bodyPr/>
+          <a:lstStyle/>
+          <a:p>
+            <a:pPr>
+              <a:buFontTx/>
+              <a:buNone/>
+            </a:pPr>
+            <a:r>
+              <a:rPr lang="en-GB" sz="1200" dirty="0" smtClean="0"/>
+              <a:t>Code for test execution</a:t>
+            </a:r>
+          </a:p>
+        </p:txBody>
+      </p:sp>
+      <p:sp>
+        <p:nvSpPr>
+          <p:cNvPr id="4" name="Slide Number Placeholder 3"/>
+          <p:cNvSpPr>
+            <a:spLocks noGrp="1"/>
+          </p:cNvSpPr>
+          <p:nvPr>
+            <p:ph type="sldNum" sz="quarter" idx="10"/>
+          </p:nvPr>
+        </p:nvSpPr>
+        <p:spPr/>
+        <p:txBody>
+          <a:bodyPr/>
+          <a:lstStyle/>
+          <a:p>
+            <a:fld id="{D0D72174-1E0F-4850-B29D-2C161ABE5122}" type="slidenum">
+              <a:rPr lang="en-GB" smtClean="0"/>
+              <a:t>15</a:t>
+            </a:fld>
+            <a:endParaRPr lang="en-GB"/>
+          </a:p>
+        </p:txBody>
+      </p:sp>
+    </p:spTree>
+    <p:extLst>
+      <p:ext uri="{BB962C8B-B14F-4D97-AF65-F5344CB8AC3E}">
+        <p14:creationId xmlns:p14="http://schemas.microsoft.com/office/powerpoint/2010/main" val="1036251049"/>
+      </p:ext>
+    </p:extLst>
+  </p:cSld>
+  <p:clrMapOvr>
+    <a:masterClrMapping/>
+  </p:clrMapOvr>
+</p:notes>
+</file>
+
+<file path=ppt/notesSlides/notesSlide16.xml><?xml version="1.0" encoding="utf-8"?>
+<p:notes xmlns:a="http://schemas.openxmlformats.org/drawingml/2006/main" xmlns:r="http://schemas.openxmlformats.org/officeDocument/2006/relationships" xmlns:p="http://schemas.openxmlformats.org/presentationml/2006/main">
+  <p:cSld>
+    <p:spTree>
+      <p:nvGrpSpPr>
+        <p:cNvPr id="1" name=""/>
+        <p:cNvGrpSpPr/>
+        <p:nvPr/>
+      </p:nvGrpSpPr>
+      <p:grpSpPr>
+        <a:xfrm>
+          <a:off x="0" y="0"/>
+          <a:ext cx="0" cy="0"/>
+          <a:chOff x="0" y="0"/>
+          <a:chExt cx="0" cy="0"/>
+        </a:xfrm>
+      </p:grpSpPr>
+      <p:sp>
+        <p:nvSpPr>
+          <p:cNvPr id="2" name="Slide Image Placeholder 1"/>
+          <p:cNvSpPr>
+            <a:spLocks noGrp="1" noRot="1" noChangeAspect="1"/>
+          </p:cNvSpPr>
+          <p:nvPr>
+            <p:ph type="sldImg"/>
+          </p:nvPr>
+        </p:nvSpPr>
+        <p:spPr/>
+      </p:sp>
+      <p:sp>
+        <p:nvSpPr>
+          <p:cNvPr id="3" name="Notes Placeholder 2"/>
+          <p:cNvSpPr>
+            <a:spLocks noGrp="1"/>
+          </p:cNvSpPr>
+          <p:nvPr>
+            <p:ph type="body" idx="1"/>
+          </p:nvPr>
+        </p:nvSpPr>
+        <p:spPr/>
+        <p:txBody>
+          <a:bodyPr/>
+          <a:lstStyle/>
+          <a:p>
+            <a:pPr>
+              <a:buFontTx/>
+              <a:buNone/>
+            </a:pPr>
+            <a:r>
+              <a:rPr lang="en-GB" sz="1200" dirty="0" smtClean="0"/>
+              <a:t>Code for logs</a:t>
+            </a:r>
+          </a:p>
+        </p:txBody>
+      </p:sp>
+      <p:sp>
+        <p:nvSpPr>
+          <p:cNvPr id="4" name="Slide Number Placeholder 3"/>
+          <p:cNvSpPr>
+            <a:spLocks noGrp="1"/>
+          </p:cNvSpPr>
+          <p:nvPr>
+            <p:ph type="sldNum" sz="quarter" idx="10"/>
+          </p:nvPr>
+        </p:nvSpPr>
+        <p:spPr/>
+        <p:txBody>
+          <a:bodyPr/>
+          <a:lstStyle/>
+          <a:p>
+            <a:fld id="{D0D72174-1E0F-4850-B29D-2C161ABE5122}" type="slidenum">
+              <a:rPr lang="en-GB" smtClean="0"/>
+              <a:t>16</a:t>
+            </a:fld>
+            <a:endParaRPr lang="en-GB"/>
+          </a:p>
+        </p:txBody>
+      </p:sp>
+    </p:spTree>
+    <p:extLst>
+      <p:ext uri="{BB962C8B-B14F-4D97-AF65-F5344CB8AC3E}">
+        <p14:creationId xmlns:p14="http://schemas.microsoft.com/office/powerpoint/2010/main" val="1036251049"/>
+      </p:ext>
+    </p:extLst>
+  </p:cSld>
+  <p:clrMapOvr>
+    <a:masterClrMapping/>
+  </p:clrMapOvr>
+</p:notes>
+</file>
+
+<file path=ppt/notesSlides/notesSlide17.xml><?xml version="1.0" encoding="utf-8"?>
+<p:notes xmlns:a="http://schemas.openxmlformats.org/drawingml/2006/main" xmlns:r="http://schemas.openxmlformats.org/officeDocument/2006/relationships" xmlns:p="http://schemas.openxmlformats.org/presentationml/2006/main">
+  <p:cSld>
+    <p:spTree>
+      <p:nvGrpSpPr>
+        <p:cNvPr id="1" name=""/>
+        <p:cNvGrpSpPr/>
+        <p:nvPr/>
+      </p:nvGrpSpPr>
+      <p:grpSpPr>
+        <a:xfrm>
+          <a:off x="0" y="0"/>
+          <a:ext cx="0" cy="0"/>
+          <a:chOff x="0" y="0"/>
+          <a:chExt cx="0" cy="0"/>
+        </a:xfrm>
+      </p:grpSpPr>
+      <p:sp>
+        <p:nvSpPr>
+          <p:cNvPr id="2" name="Slide Image Placeholder 1"/>
+          <p:cNvSpPr>
+            <a:spLocks noGrp="1" noRot="1" noChangeAspect="1"/>
+          </p:cNvSpPr>
+          <p:nvPr>
+            <p:ph type="sldImg"/>
+          </p:nvPr>
+        </p:nvSpPr>
+        <p:spPr/>
+      </p:sp>
+      <p:sp>
+        <p:nvSpPr>
+          <p:cNvPr id="3" name="Notes Placeholder 2"/>
+          <p:cNvSpPr>
+            <a:spLocks noGrp="1"/>
+          </p:cNvSpPr>
+          <p:nvPr>
+            <p:ph type="body" idx="1"/>
+          </p:nvPr>
+        </p:nvSpPr>
+        <p:spPr/>
+        <p:txBody>
+          <a:bodyPr/>
+          <a:lstStyle/>
+          <a:p>
+            <a:pPr>
+              <a:buFontTx/>
+              <a:buNone/>
+            </a:pPr>
+            <a:r>
+              <a:rPr lang="en-GB" sz="1200" dirty="0" smtClean="0"/>
+              <a:t>Demo</a:t>
+            </a:r>
+          </a:p>
+        </p:txBody>
+      </p:sp>
+      <p:sp>
+        <p:nvSpPr>
+          <p:cNvPr id="4" name="Slide Number Placeholder 3"/>
+          <p:cNvSpPr>
+            <a:spLocks noGrp="1"/>
+          </p:cNvSpPr>
+          <p:nvPr>
+            <p:ph type="sldNum" sz="quarter" idx="10"/>
+          </p:nvPr>
+        </p:nvSpPr>
+        <p:spPr/>
+        <p:txBody>
+          <a:bodyPr/>
+          <a:lstStyle/>
+          <a:p>
+            <a:fld id="{D0D72174-1E0F-4850-B29D-2C161ABE5122}" type="slidenum">
+              <a:rPr lang="en-GB" smtClean="0"/>
+              <a:t>17</a:t>
+            </a:fld>
+            <a:endParaRPr lang="en-GB"/>
+          </a:p>
+        </p:txBody>
+      </p:sp>
+    </p:spTree>
+    <p:extLst>
+      <p:ext uri="{BB962C8B-B14F-4D97-AF65-F5344CB8AC3E}">
+        <p14:creationId xmlns:p14="http://schemas.microsoft.com/office/powerpoint/2010/main" val="1036251049"/>
+      </p:ext>
+    </p:extLst>
+  </p:cSld>
+  <p:clrMapOvr>
+    <a:masterClrMapping/>
+  </p:clrMapOvr>
+</p:notes>
+</file>
+
+<file path=ppt/notesSlides/notesSlide18.xml><?xml version="1.0" encoding="utf-8"?>
+<p:notes xmlns:a="http://schemas.openxmlformats.org/drawingml/2006/main" xmlns:r="http://schemas.openxmlformats.org/officeDocument/2006/relationships" xmlns:p="http://schemas.openxmlformats.org/presentationml/2006/main">
+  <p:cSld>
+    <p:spTree>
+      <p:nvGrpSpPr>
+        <p:cNvPr id="1" name=""/>
+        <p:cNvGrpSpPr/>
+        <p:nvPr/>
+      </p:nvGrpSpPr>
+      <p:grpSpPr>
+        <a:xfrm>
+          <a:off x="0" y="0"/>
+          <a:ext cx="0" cy="0"/>
+          <a:chOff x="0" y="0"/>
+          <a:chExt cx="0" cy="0"/>
+        </a:xfrm>
+      </p:grpSpPr>
+      <p:sp>
+        <p:nvSpPr>
+          <p:cNvPr id="2" name="Slide Image Placeholder 1"/>
+          <p:cNvSpPr>
+            <a:spLocks noGrp="1" noRot="1" noChangeAspect="1"/>
+          </p:cNvSpPr>
+          <p:nvPr>
+            <p:ph type="sldImg"/>
+          </p:nvPr>
+        </p:nvSpPr>
+        <p:spPr/>
+      </p:sp>
+      <p:sp>
+        <p:nvSpPr>
+          <p:cNvPr id="3" name="Notes Placeholder 2"/>
+          <p:cNvSpPr>
+            <a:spLocks noGrp="1"/>
+          </p:cNvSpPr>
+          <p:nvPr>
+            <p:ph type="body" idx="1"/>
+          </p:nvPr>
+        </p:nvSpPr>
+        <p:spPr/>
+        <p:txBody>
+          <a:bodyPr/>
+          <a:lstStyle/>
+          <a:p>
+            <a:pPr>
+              <a:buFontTx/>
+              <a:buNone/>
+            </a:pPr>
+            <a:r>
+              <a:rPr lang="en-GB" sz="1200" dirty="0" smtClean="0"/>
+              <a:t>Extra info</a:t>
+            </a:r>
+          </a:p>
+        </p:txBody>
+      </p:sp>
+      <p:sp>
+        <p:nvSpPr>
+          <p:cNvPr id="4" name="Slide Number Placeholder 3"/>
+          <p:cNvSpPr>
+            <a:spLocks noGrp="1"/>
+          </p:cNvSpPr>
+          <p:nvPr>
+            <p:ph type="sldNum" sz="quarter" idx="10"/>
+          </p:nvPr>
+        </p:nvSpPr>
+        <p:spPr/>
+        <p:txBody>
+          <a:bodyPr/>
+          <a:lstStyle/>
+          <a:p>
+            <a:fld id="{D0D72174-1E0F-4850-B29D-2C161ABE5122}" type="slidenum">
+              <a:rPr lang="en-GB" smtClean="0"/>
+              <a:t>18</a:t>
             </a:fld>
             <a:endParaRPr lang="en-GB"/>
           </a:p>
@@ -1059,6 +1721,14 @@
           <a:bodyPr/>
           <a:lstStyle/>
           <a:p>
+            <a:r>
+              <a:rPr lang="en-GB" dirty="0" smtClean="0"/>
+              <a:t>Testing the Accessibility</a:t>
+            </a:r>
+            <a:r>
+              <a:rPr lang="en-GB" baseline="0" dirty="0" smtClean="0"/>
+              <a:t> of a Web Site</a:t>
+            </a:r>
             <a:endParaRPr lang="en-GB" dirty="0"/>
           </a:p>
         </p:txBody>
@@ -1143,6 +1813,10 @@
           <a:bodyPr/>
           <a:lstStyle/>
           <a:p>
+            <a:r>
+              <a:rPr lang="en-GB" sz="1200" dirty="0" smtClean="0"/>
+              <a:t>Accessibility test automation example</a:t>
+            </a:r>
             <a:endParaRPr lang="en-GB" dirty="0"/>
           </a:p>
         </p:txBody>
@@ -1227,6 +1901,10 @@
           <a:bodyPr/>
           <a:lstStyle/>
           <a:p>
+            <a:r>
+              <a:rPr lang="en-GB" sz="1200" dirty="0" smtClean="0"/>
+              <a:t>Tools used in this example</a:t>
+            </a:r>
             <a:endParaRPr lang="en-GB" dirty="0"/>
           </a:p>
         </p:txBody>
@@ -1311,6 +1989,18 @@
           <a:bodyPr/>
           <a:lstStyle/>
           <a:p>
+            <a:r>
+              <a:rPr lang="en-GB" sz="1200" dirty="0" smtClean="0"/>
+              <a:t>What we need from</a:t>
+            </a:r>
+            <a:r>
+              <a:rPr lang="en-GB" sz="1200" baseline="0" dirty="0" smtClean="0"/>
+              <a:t> </a:t>
+            </a:r>
+            <a:r>
+              <a:rPr lang="en-GB" sz="1200" dirty="0" smtClean="0"/>
+              <a:t>accessibility-developer-tools</a:t>
+            </a:r>
             <a:endParaRPr lang="en-GB" dirty="0"/>
           </a:p>
         </p:txBody>
@@ -1395,6 +2085,10 @@
           <a:bodyPr/>
           <a:lstStyle/>
           <a:p>
+            <a:r>
+              <a:rPr lang="en-GB" sz="1200" dirty="0" smtClean="0"/>
+              <a:t>What we need from Selenium</a:t>
+            </a:r>
             <a:endParaRPr lang="en-GB" dirty="0"/>
           </a:p>
         </p:txBody>
@@ -1646,7 +2340,7 @@
             <a:fld id="{1D8BD707-D9CF-40AE-B4C6-C98DA3205C09}" type="datetimeFigureOut">
               <a:rPr lang="en-US" smtClean="0"/>
               <a:pPr/>
-              <a:t>9/21/2015</a:t>
+              <a:t>10/1/2015</a:t>
             </a:fld>
             <a:endParaRPr lang="en-US"/>
           </a:p>
@@ -1834,7 +2528,7 @@
             <a:fld id="{1D8BD707-D9CF-40AE-B4C6-C98DA3205C09}" type="datetimeFigureOut">
               <a:rPr lang="en-US" smtClean="0"/>
               <a:pPr/>
-              <a:t>9/21/2015</a:t>
+              <a:t>10/1/2015</a:t>
             </a:fld>
             <a:endParaRPr lang="en-US"/>
           </a:p>
@@ -2018,7 +2712,7 @@
             <a:fld id="{1D8BD707-D9CF-40AE-B4C6-C98DA3205C09}" type="datetimeFigureOut">
               <a:rPr lang="en-US" smtClean="0"/>
               <a:pPr/>
-              <a:t>9/21/2015</a:t>
+              <a:t>10/1/2015</a:t>
             </a:fld>
             <a:endParaRPr lang="en-US"/>
           </a:p>
@@ -2213,7 +2907,7 @@
             <a:fld id="{1D8BD707-D9CF-40AE-B4C6-C98DA3205C09}" type="datetimeFigureOut">
               <a:rPr lang="en-US" smtClean="0"/>
               <a:pPr/>
-              <a:t>9/21/2015</a:t>
+              <a:t>10/1/2015</a:t>
             </a:fld>
             <a:endParaRPr lang="en-US"/>
           </a:p>
@@ -2341,7 +3035,7 @@
             <a:fld id="{1D8BD707-D9CF-40AE-B4C6-C98DA3205C09}" type="datetimeFigureOut">
               <a:rPr lang="en-US" smtClean="0"/>
               <a:pPr/>
-              <a:t>9/21/2015</a:t>
+              <a:t>10/1/2015</a:t>
             </a:fld>
             <a:endParaRPr lang="en-US"/>
           </a:p>
@@ -2732,7 +3426,7 @@
             <a:fld id="{1D8BD707-D9CF-40AE-B4C6-C98DA3205C09}" type="datetimeFigureOut">
               <a:rPr lang="en-US" smtClean="0"/>
               <a:pPr/>
-              <a:t>9/21/2015</a:t>
+              <a:t>10/1/2015</a:t>
             </a:fld>
             <a:endParaRPr lang="en-US"/>
           </a:p>
@@ -3179,7 +3873,7 @@
             <a:fld id="{1D8BD707-D9CF-40AE-B4C6-C98DA3205C09}" type="datetimeFigureOut">
               <a:rPr lang="en-US" smtClean="0"/>
               <a:pPr/>
-              <a:t>9/21/2015</a:t>
+              <a:t>10/1/2015</a:t>
             </a:fld>
             <a:endParaRPr lang="en-US"/>
           </a:p>
@@ -3306,7 +4000,7 @@
             <a:fld id="{1D8BD707-D9CF-40AE-B4C6-C98DA3205C09}" type="datetimeFigureOut">
               <a:rPr lang="en-US" smtClean="0"/>
               <a:pPr/>
-              <a:t>9/21/2015</a:t>
+              <a:t>10/1/2015</a:t>
             </a:fld>
             <a:endParaRPr lang="en-US"/>
           </a:p>
@@ -3405,7 +4099,7 @@
             <a:fld id="{1D8BD707-D9CF-40AE-B4C6-C98DA3205C09}" type="datetimeFigureOut">
               <a:rPr lang="en-US" smtClean="0"/>
               <a:pPr/>
-              <a:t>9/21/2015</a:t>
+              <a:t>10/1/2015</a:t>
             </a:fld>
             <a:endParaRPr lang="en-US"/>
           </a:p>
@@ -3698,7 +4392,7 @@
             <a:fld id="{1D8BD707-D9CF-40AE-B4C6-C98DA3205C09}" type="datetimeFigureOut">
               <a:rPr lang="en-US" smtClean="0"/>
               <a:pPr/>
-              <a:t>9/21/2015</a:t>
+              <a:t>10/1/2015</a:t>
             </a:fld>
             <a:endParaRPr lang="en-US"/>
           </a:p>
@@ -3969,7 +4663,7 @@
             <a:fld id="{1D8BD707-D9CF-40AE-B4C6-C98DA3205C09}" type="datetimeFigureOut">
               <a:rPr lang="en-US" smtClean="0"/>
               <a:pPr/>
-              <a:t>9/21/2015</a:t>
+              <a:t>10/1/2015</a:t>
             </a:fld>
             <a:endParaRPr lang="en-US"/>
           </a:p>
@@ -4254,7 +4948,7 @@
             <a:fld id="{1D8BD707-D9CF-40AE-B4C6-C98DA3205C09}" type="datetimeFigureOut">
               <a:rPr lang="en-US" smtClean="0"/>
               <a:pPr/>
-              <a:t>9/21/2015</a:t>
+              <a:t>10/1/2015</a:t>
             </a:fld>
             <a:endParaRPr lang="en-US"/>
           </a:p>
@@ -4711,15 +5405,7 @@
             </a:pPr>
             <a:r>
               <a:rPr lang="en-GB" sz="2000" dirty="0" smtClean="0"/>
-              <a:t>Cucumber </a:t>
-            </a:r>
-            <a:r>
-              <a:rPr lang="en-GB" sz="2000" dirty="0"/>
-              <a:t>&amp;</a:t>
-            </a:r>
-            <a:r>
-              <a:rPr lang="en-GB" sz="2000" dirty="0" smtClean="0"/>
-              <a:t> Gherkin</a:t>
+              <a:t>Scala</a:t>
             </a:r>
           </a:p>
           <a:p>
@@ -4729,17 +5415,15 @@
             </a:pPr>
             <a:r>
               <a:rPr lang="en-GB" sz="2000" dirty="0" smtClean="0"/>
-              <a:t>Scala</a:t>
-            </a:r>
-          </a:p>
-          <a:p>
-            <a:pPr marL="285750" indent="-285750" algn="l">
-              <a:buFontTx/>
-              <a:buChar char="-"/>
-            </a:pPr>
+              <a:t>Cucumber </a:t>
+            </a:r>
+            <a:r>
+              <a:rPr lang="en-GB" sz="2000" dirty="0"/>
+              <a:t>&amp;</a:t>
+            </a:r>
             <a:r>
               <a:rPr lang="en-GB" sz="2000" dirty="0" smtClean="0"/>
-              <a:t>Jenkins</a:t>
+              <a:t> Gherkin</a:t>
             </a:r>
           </a:p>
         </p:txBody>
@@ -4784,6 +5468,13 @@
   <p:clrMapOvr>
     <a:masterClrMapping/>
   </p:clrMapOvr>
+  <p:timing>
+    <p:tnLst>
+      <p:par>
+        <p:cTn id="1" dur="indefinite" restart="never" nodeType="tmRoot"/>
+      </p:par>
+    </p:tnLst>
+  </p:timing>
 </p:sld>
 </file>
 
@@ -4806,7 +5497,7 @@
       </p:grpSpPr>
       <p:sp>
         <p:nvSpPr>
-          <p:cNvPr id="9" name="Subtitle 2"/>
+          <p:cNvPr id="9" name="Subtitle"/>
           <p:cNvSpPr txBox="1">
             <a:spLocks/>
           </p:cNvSpPr>
@@ -4823,7 +5514,7 @@
         </p:spPr>
         <p:txBody>
           <a:bodyPr vert="horz" lIns="91440" tIns="45720" rIns="91440" bIns="45720" rtlCol="0" anchor="ctr">
-            <a:normAutofit lnSpcReduction="10000"/>
+            <a:normAutofit/>
           </a:bodyPr>
           <a:lstStyle>
             <a:lvl1pPr marL="182880" indent="-182880" algn="l" defTabSz="914400" rtl="0" eaLnBrk="1" latinLnBrk="0" hangingPunct="1">
@@ -5055,9 +5746,15 @@
             <a:pPr marL="0" indent="0">
               <a:buNone/>
             </a:pPr>
+            <a:endParaRPr lang="en-GB" sz="3200" dirty="0" smtClean="0"/>
+          </a:p>
+          <a:p>
+            <a:pPr marL="0" indent="0">
+              <a:buNone/>
+            </a:pPr>
             <a:r>
               <a:rPr lang="en-GB" sz="3200" dirty="0" smtClean="0"/>
-              <a:t>Scala is not listed but Scala is compatible with Java. Scala </a:t>
+              <a:t>Scala is not listed, but Scala is compatible with Java. Scala </a:t>
             </a:r>
             <a:r>
               <a:rPr lang="en-GB" sz="3200" dirty="0"/>
@@ -5079,32 +5776,11 @@
             </a:r>
             <a:endParaRPr lang="en-GB" sz="3200" dirty="0"/>
           </a:p>
-          <a:p>
-            <a:pPr marL="0" indent="0">
-              <a:buNone/>
-            </a:pPr>
-            <a:endParaRPr lang="en-GB" sz="3200" dirty="0"/>
-          </a:p>
-          <a:p>
-            <a:pPr marL="0" indent="0">
-              <a:buNone/>
-            </a:pPr>
-            <a:endParaRPr lang="en-GB" sz="3200" dirty="0" smtClean="0"/>
-          </a:p>
-          <a:p>
-            <a:pPr marL="0" indent="0">
-              <a:buNone/>
-            </a:pPr>
-            <a:r>
-              <a:rPr lang="en-GB" sz="3200" dirty="0" smtClean="0"/>
-              <a:t>I am using Scala because I am more familiar with it.</a:t>
-            </a:r>
-          </a:p>
-        </p:txBody>
-      </p:sp>
-      <p:sp>
-        <p:nvSpPr>
-          <p:cNvPr id="7" name="Title 6"/>
+        </p:txBody>
+      </p:sp>
+      <p:sp>
+        <p:nvSpPr>
+          <p:cNvPr id="7" name="Title"/>
           <p:cNvSpPr>
             <a:spLocks noGrp="1"/>
           </p:cNvSpPr>
@@ -5164,7 +5840,7 @@
       </p:grpSpPr>
       <p:sp>
         <p:nvSpPr>
-          <p:cNvPr id="9" name="Subtitle 2"/>
+          <p:cNvPr id="9" name="Subtitle"/>
           <p:cNvSpPr txBox="1">
             <a:spLocks/>
           </p:cNvSpPr>
@@ -5390,7 +6066,7 @@
             </a:pPr>
             <a:r>
               <a:rPr lang="en-GB" sz="3200" dirty="0" smtClean="0"/>
-              <a:t>It is optional to use Cucumber as you can achieve everything by writing Scala code for Selenium ;</a:t>
+              <a:t>It is optional to use Cucumber as you can achieve similar results by writing Scala code for Selenium;</a:t>
             </a:r>
             <a:br>
               <a:rPr lang="en-GB" sz="3200" dirty="0" smtClean="0"/>
@@ -5404,7 +6080,7 @@
             </a:br>
             <a:r>
               <a:rPr lang="en-GB" sz="3200" dirty="0" smtClean="0"/>
-              <a:t>Cucumber is used to organise my tests and make them readable for a larger audience.</a:t>
+              <a:t>Cucumber is used in this example to organise the test suite and make the user journey readable by a larger audience.</a:t>
             </a:r>
             <a:endParaRPr lang="en-GB" sz="3200" dirty="0"/>
           </a:p>
@@ -5412,7 +6088,7 @@
       </p:sp>
       <p:sp>
         <p:nvSpPr>
-          <p:cNvPr id="7" name="Title 6"/>
+          <p:cNvPr id="7" name="Title"/>
           <p:cNvSpPr>
             <a:spLocks noGrp="1"/>
           </p:cNvSpPr>
@@ -5444,6 +6120,3062 @@
     <p:extLst>
       <p:ext uri="{BB962C8B-B14F-4D97-AF65-F5344CB8AC3E}">
         <p14:creationId xmlns:p14="http://schemas.microsoft.com/office/powerpoint/2010/main" val="3223183505"/>
+      </p:ext>
+    </p:extLst>
+  </p:cSld>
+  <p:clrMapOvr>
+    <a:masterClrMapping/>
+  </p:clrMapOvr>
+</p:sld>
+</file>
+
+<file path=ppt/slides/slide12.xml><?xml version="1.0" encoding="utf-8"?>
+<p:sld xmlns:a="http://schemas.openxmlformats.org/drawingml/2006/main" xmlns:r="http://schemas.openxmlformats.org/officeDocument/2006/relationships" xmlns:p="http://schemas.openxmlformats.org/presentationml/2006/main">
+  <p:cSld>
+    <p:spTree>
+      <p:nvGrpSpPr>
+        <p:cNvPr id="1" name=""/>
+        <p:cNvGrpSpPr/>
+        <p:nvPr/>
+      </p:nvGrpSpPr>
+      <p:grpSpPr>
+        <a:xfrm>
+          <a:off x="0" y="0"/>
+          <a:ext cx="0" cy="0"/>
+          <a:chOff x="0" y="0"/>
+          <a:chExt cx="0" cy="0"/>
+        </a:xfrm>
+      </p:grpSpPr>
+      <p:sp>
+        <p:nvSpPr>
+          <p:cNvPr id="9" name="Subtitle"/>
+          <p:cNvSpPr txBox="1">
+            <a:spLocks/>
+          </p:cNvSpPr>
+          <p:nvPr/>
+        </p:nvSpPr>
+        <p:spPr>
+          <a:xfrm>
+            <a:off x="533400" y="1066800"/>
+            <a:ext cx="7848600" cy="4724400"/>
+          </a:xfrm>
+          <a:prstGeom prst="rect">
+            <a:avLst/>
+          </a:prstGeom>
+        </p:spPr>
+        <p:txBody>
+          <a:bodyPr vert="horz" lIns="91440" tIns="45720" rIns="91440" bIns="45720" rtlCol="0" anchor="ctr">
+            <a:normAutofit/>
+          </a:bodyPr>
+          <a:lstStyle>
+            <a:lvl1pPr marL="182880" indent="-182880" algn="l" defTabSz="914400" rtl="0" eaLnBrk="1" latinLnBrk="0" hangingPunct="1">
+              <a:spcBef>
+                <a:spcPct val="20000"/>
+              </a:spcBef>
+              <a:buClr>
+                <a:schemeClr val="tx1">
+                  <a:lumMod val="50000"/>
+                  <a:lumOff val="50000"/>
+                </a:schemeClr>
+              </a:buClr>
+              <a:buFont typeface="Wingdings" pitchFamily="2" charset="2"/>
+              <a:buChar char="§"/>
+              <a:defRPr sz="1800" kern="1200">
+                <a:solidFill>
+                  <a:schemeClr val="tx1">
+                    <a:lumMod val="85000"/>
+                  </a:schemeClr>
+                </a:solidFill>
+                <a:latin typeface="+mn-lt"/>
+                <a:ea typeface="+mn-ea"/>
+                <a:cs typeface="+mn-cs"/>
+              </a:defRPr>
+            </a:lvl1pPr>
+            <a:lvl2pPr marL="411480" indent="-182880" algn="l" defTabSz="914400" rtl="0" eaLnBrk="1" latinLnBrk="0" hangingPunct="1">
+              <a:spcBef>
+                <a:spcPct val="20000"/>
+              </a:spcBef>
+              <a:buClr>
+                <a:schemeClr val="tx1">
+                  <a:lumMod val="50000"/>
+                  <a:lumOff val="50000"/>
+                </a:schemeClr>
+              </a:buClr>
+              <a:buFont typeface="Wingdings" pitchFamily="2" charset="2"/>
+              <a:buChar char="§"/>
+              <a:defRPr sz="1400" kern="1200">
+                <a:solidFill>
+                  <a:schemeClr val="tx1">
+                    <a:lumMod val="85000"/>
+                  </a:schemeClr>
+                </a:solidFill>
+                <a:latin typeface="+mn-lt"/>
+                <a:ea typeface="+mn-ea"/>
+                <a:cs typeface="+mn-cs"/>
+              </a:defRPr>
+            </a:lvl2pPr>
+            <a:lvl3pPr marL="594360" indent="-182880" algn="l" defTabSz="914400" rtl="0" eaLnBrk="1" latinLnBrk="0" hangingPunct="1">
+              <a:spcBef>
+                <a:spcPct val="20000"/>
+              </a:spcBef>
+              <a:buClr>
+                <a:schemeClr val="tx1">
+                  <a:lumMod val="50000"/>
+                  <a:lumOff val="50000"/>
+                </a:schemeClr>
+              </a:buClr>
+              <a:buFont typeface="Wingdings" pitchFamily="2" charset="2"/>
+              <a:buChar char="§"/>
+              <a:defRPr sz="1400" kern="1200">
+                <a:solidFill>
+                  <a:schemeClr val="tx1">
+                    <a:lumMod val="85000"/>
+                  </a:schemeClr>
+                </a:solidFill>
+                <a:latin typeface="+mn-lt"/>
+                <a:ea typeface="+mn-ea"/>
+                <a:cs typeface="+mn-cs"/>
+              </a:defRPr>
+            </a:lvl3pPr>
+            <a:lvl4pPr marL="777240" indent="-182880" algn="l" defTabSz="914400" rtl="0" eaLnBrk="1" latinLnBrk="0" hangingPunct="1">
+              <a:spcBef>
+                <a:spcPct val="20000"/>
+              </a:spcBef>
+              <a:buClr>
+                <a:schemeClr val="tx1">
+                  <a:lumMod val="50000"/>
+                  <a:lumOff val="50000"/>
+                </a:schemeClr>
+              </a:buClr>
+              <a:buFont typeface="Wingdings" pitchFamily="2" charset="2"/>
+              <a:buChar char="§"/>
+              <a:defRPr sz="1400" kern="1200">
+                <a:solidFill>
+                  <a:schemeClr val="tx1">
+                    <a:lumMod val="85000"/>
+                  </a:schemeClr>
+                </a:solidFill>
+                <a:latin typeface="+mn-lt"/>
+                <a:ea typeface="+mn-ea"/>
+                <a:cs typeface="+mn-cs"/>
+              </a:defRPr>
+            </a:lvl4pPr>
+            <a:lvl5pPr marL="960120" indent="-182880" algn="l" defTabSz="914400" rtl="0" eaLnBrk="1" latinLnBrk="0" hangingPunct="1">
+              <a:spcBef>
+                <a:spcPct val="20000"/>
+              </a:spcBef>
+              <a:buClr>
+                <a:schemeClr val="tx1">
+                  <a:lumMod val="50000"/>
+                  <a:lumOff val="50000"/>
+                </a:schemeClr>
+              </a:buClr>
+              <a:buFont typeface="Wingdings" pitchFamily="2" charset="2"/>
+              <a:buChar char="§"/>
+              <a:defRPr sz="1400" kern="1200">
+                <a:solidFill>
+                  <a:schemeClr val="tx1">
+                    <a:lumMod val="85000"/>
+                  </a:schemeClr>
+                </a:solidFill>
+                <a:latin typeface="+mn-lt"/>
+                <a:ea typeface="+mn-ea"/>
+                <a:cs typeface="+mn-cs"/>
+              </a:defRPr>
+            </a:lvl5pPr>
+            <a:lvl6pPr marL="1143000" indent="-182880" algn="l" defTabSz="914400" rtl="0" eaLnBrk="1" latinLnBrk="0" hangingPunct="1">
+              <a:spcBef>
+                <a:spcPts val="288"/>
+              </a:spcBef>
+              <a:buClr>
+                <a:schemeClr val="tx1">
+                  <a:lumMod val="50000"/>
+                  <a:lumOff val="50000"/>
+                </a:schemeClr>
+              </a:buClr>
+              <a:buFont typeface="Wingdings" pitchFamily="2" charset="2"/>
+              <a:buChar char="§"/>
+              <a:defRPr sz="1400" kern="1200" baseline="0">
+                <a:solidFill>
+                  <a:schemeClr val="tx1"/>
+                </a:solidFill>
+                <a:latin typeface="+mn-lt"/>
+                <a:ea typeface="+mn-ea"/>
+                <a:cs typeface="+mn-cs"/>
+              </a:defRPr>
+            </a:lvl6pPr>
+            <a:lvl7pPr marL="1325880" indent="-182880" algn="l" defTabSz="914400" rtl="0" eaLnBrk="1" latinLnBrk="0" hangingPunct="1">
+              <a:spcBef>
+                <a:spcPts val="288"/>
+              </a:spcBef>
+              <a:buClr>
+                <a:schemeClr val="tx1">
+                  <a:lumMod val="50000"/>
+                  <a:lumOff val="50000"/>
+                </a:schemeClr>
+              </a:buClr>
+              <a:buFont typeface="Wingdings" pitchFamily="2" charset="2"/>
+              <a:buChar char="§"/>
+              <a:defRPr sz="1400" kern="1200" baseline="0">
+                <a:solidFill>
+                  <a:schemeClr val="tx1"/>
+                </a:solidFill>
+                <a:latin typeface="+mn-lt"/>
+                <a:ea typeface="+mn-ea"/>
+                <a:cs typeface="+mn-cs"/>
+              </a:defRPr>
+            </a:lvl7pPr>
+            <a:lvl8pPr marL="1508760" indent="-182880" algn="l" defTabSz="914400" rtl="0" eaLnBrk="1" latinLnBrk="0" hangingPunct="1">
+              <a:spcBef>
+                <a:spcPts val="288"/>
+              </a:spcBef>
+              <a:buClr>
+                <a:schemeClr val="tx1">
+                  <a:lumMod val="50000"/>
+                  <a:lumOff val="50000"/>
+                </a:schemeClr>
+              </a:buClr>
+              <a:buFont typeface="Wingdings" pitchFamily="2" charset="2"/>
+              <a:buChar char="§"/>
+              <a:defRPr sz="1400" kern="1200" baseline="0">
+                <a:solidFill>
+                  <a:schemeClr val="tx1"/>
+                </a:solidFill>
+                <a:latin typeface="+mn-lt"/>
+                <a:ea typeface="+mn-ea"/>
+                <a:cs typeface="+mn-cs"/>
+              </a:defRPr>
+            </a:lvl8pPr>
+            <a:lvl9pPr marL="1691640" indent="-182880" algn="l" defTabSz="914400" rtl="0" eaLnBrk="1" latinLnBrk="0" hangingPunct="1">
+              <a:spcBef>
+                <a:spcPts val="288"/>
+              </a:spcBef>
+              <a:buClr>
+                <a:schemeClr val="tx1">
+                  <a:lumMod val="50000"/>
+                  <a:lumOff val="50000"/>
+                </a:schemeClr>
+              </a:buClr>
+              <a:buFont typeface="Wingdings" pitchFamily="2" charset="2"/>
+              <a:buChar char="§"/>
+              <a:defRPr sz="1400" kern="1200" baseline="0">
+                <a:solidFill>
+                  <a:schemeClr val="tx1"/>
+                </a:solidFill>
+                <a:latin typeface="+mn-lt"/>
+                <a:ea typeface="+mn-ea"/>
+                <a:cs typeface="+mn-cs"/>
+              </a:defRPr>
+            </a:lvl9pPr>
+          </a:lstStyle>
+          <a:p>
+            <a:pPr>
+              <a:buFontTx/>
+              <a:buChar char="-"/>
+            </a:pPr>
+            <a:r>
+              <a:rPr lang="en-GB" sz="3200" dirty="0" smtClean="0"/>
+              <a:t>User journey</a:t>
+            </a:r>
+          </a:p>
+          <a:p>
+            <a:pPr>
+              <a:buFontTx/>
+              <a:buChar char="-"/>
+            </a:pPr>
+            <a:r>
+              <a:rPr lang="en-GB" sz="3200" dirty="0" smtClean="0"/>
+              <a:t>Code for journey</a:t>
+            </a:r>
+          </a:p>
+          <a:p>
+            <a:pPr>
+              <a:buFontTx/>
+              <a:buChar char="-"/>
+            </a:pPr>
+            <a:r>
+              <a:rPr lang="en-GB" sz="3200" dirty="0" smtClean="0"/>
+              <a:t>Code for test execution</a:t>
+            </a:r>
+          </a:p>
+          <a:p>
+            <a:pPr>
+              <a:buFontTx/>
+              <a:buChar char="-"/>
+            </a:pPr>
+            <a:r>
+              <a:rPr lang="en-GB" sz="3200" dirty="0" smtClean="0"/>
+              <a:t>Code for logs</a:t>
+            </a:r>
+            <a:endParaRPr lang="en-GB" sz="3200" dirty="0"/>
+          </a:p>
+        </p:txBody>
+      </p:sp>
+      <p:sp>
+        <p:nvSpPr>
+          <p:cNvPr id="7" name="Title"/>
+          <p:cNvSpPr>
+            <a:spLocks noGrp="1"/>
+          </p:cNvSpPr>
+          <p:nvPr>
+            <p:ph type="title"/>
+          </p:nvPr>
+        </p:nvSpPr>
+        <p:spPr>
+          <a:xfrm>
+            <a:off x="457200" y="381000"/>
+            <a:ext cx="8001000" cy="609600"/>
+          </a:xfrm>
+        </p:spPr>
+        <p:txBody>
+          <a:bodyPr>
+            <a:noAutofit/>
+          </a:bodyPr>
+          <a:lstStyle/>
+          <a:p>
+            <a:r>
+              <a:rPr lang="en-GB" sz="4000" dirty="0" smtClean="0"/>
+              <a:t>Checklist for Implementation</a:t>
+            </a:r>
+            <a:endParaRPr lang="en-GB" sz="4000" dirty="0"/>
+          </a:p>
+        </p:txBody>
+      </p:sp>
+    </p:spTree>
+    <p:extLst>
+      <p:ext uri="{BB962C8B-B14F-4D97-AF65-F5344CB8AC3E}">
+        <p14:creationId xmlns:p14="http://schemas.microsoft.com/office/powerpoint/2010/main" val="3087294003"/>
+      </p:ext>
+    </p:extLst>
+  </p:cSld>
+  <p:clrMapOvr>
+    <a:masterClrMapping/>
+  </p:clrMapOvr>
+</p:sld>
+</file>
+
+<file path=ppt/slides/slide13.xml><?xml version="1.0" encoding="utf-8"?>
+<p:sld xmlns:a="http://schemas.openxmlformats.org/drawingml/2006/main" xmlns:r="http://schemas.openxmlformats.org/officeDocument/2006/relationships" xmlns:p="http://schemas.openxmlformats.org/presentationml/2006/main">
+  <p:cSld>
+    <p:spTree>
+      <p:nvGrpSpPr>
+        <p:cNvPr id="1" name=""/>
+        <p:cNvGrpSpPr/>
+        <p:nvPr/>
+      </p:nvGrpSpPr>
+      <p:grpSpPr>
+        <a:xfrm>
+          <a:off x="0" y="0"/>
+          <a:ext cx="0" cy="0"/>
+          <a:chOff x="0" y="0"/>
+          <a:chExt cx="0" cy="0"/>
+        </a:xfrm>
+      </p:grpSpPr>
+      <p:sp>
+        <p:nvSpPr>
+          <p:cNvPr id="9" name="Subtitle"/>
+          <p:cNvSpPr txBox="1">
+            <a:spLocks/>
+          </p:cNvSpPr>
+          <p:nvPr/>
+        </p:nvSpPr>
+        <p:spPr>
+          <a:xfrm>
+            <a:off x="533400" y="1066800"/>
+            <a:ext cx="7848600" cy="5105400"/>
+          </a:xfrm>
+          <a:prstGeom prst="rect">
+            <a:avLst/>
+          </a:prstGeom>
+        </p:spPr>
+        <p:txBody>
+          <a:bodyPr vert="horz" lIns="91440" tIns="45720" rIns="91440" bIns="45720" rtlCol="0" anchor="ctr">
+            <a:normAutofit fontScale="85000" lnSpcReduction="10000"/>
+          </a:bodyPr>
+          <a:lstStyle>
+            <a:lvl1pPr marL="182880" indent="-182880" algn="l" defTabSz="914400" rtl="0" eaLnBrk="1" latinLnBrk="0" hangingPunct="1">
+              <a:spcBef>
+                <a:spcPct val="20000"/>
+              </a:spcBef>
+              <a:buClr>
+                <a:schemeClr val="tx1">
+                  <a:lumMod val="50000"/>
+                  <a:lumOff val="50000"/>
+                </a:schemeClr>
+              </a:buClr>
+              <a:buFont typeface="Wingdings" pitchFamily="2" charset="2"/>
+              <a:buChar char="§"/>
+              <a:defRPr sz="1800" kern="1200">
+                <a:solidFill>
+                  <a:schemeClr val="tx1">
+                    <a:lumMod val="85000"/>
+                  </a:schemeClr>
+                </a:solidFill>
+                <a:latin typeface="+mn-lt"/>
+                <a:ea typeface="+mn-ea"/>
+                <a:cs typeface="+mn-cs"/>
+              </a:defRPr>
+            </a:lvl1pPr>
+            <a:lvl2pPr marL="411480" indent="-182880" algn="l" defTabSz="914400" rtl="0" eaLnBrk="1" latinLnBrk="0" hangingPunct="1">
+              <a:spcBef>
+                <a:spcPct val="20000"/>
+              </a:spcBef>
+              <a:buClr>
+                <a:schemeClr val="tx1">
+                  <a:lumMod val="50000"/>
+                  <a:lumOff val="50000"/>
+                </a:schemeClr>
+              </a:buClr>
+              <a:buFont typeface="Wingdings" pitchFamily="2" charset="2"/>
+              <a:buChar char="§"/>
+              <a:defRPr sz="1400" kern="1200">
+                <a:solidFill>
+                  <a:schemeClr val="tx1">
+                    <a:lumMod val="85000"/>
+                  </a:schemeClr>
+                </a:solidFill>
+                <a:latin typeface="+mn-lt"/>
+                <a:ea typeface="+mn-ea"/>
+                <a:cs typeface="+mn-cs"/>
+              </a:defRPr>
+            </a:lvl2pPr>
+            <a:lvl3pPr marL="594360" indent="-182880" algn="l" defTabSz="914400" rtl="0" eaLnBrk="1" latinLnBrk="0" hangingPunct="1">
+              <a:spcBef>
+                <a:spcPct val="20000"/>
+              </a:spcBef>
+              <a:buClr>
+                <a:schemeClr val="tx1">
+                  <a:lumMod val="50000"/>
+                  <a:lumOff val="50000"/>
+                </a:schemeClr>
+              </a:buClr>
+              <a:buFont typeface="Wingdings" pitchFamily="2" charset="2"/>
+              <a:buChar char="§"/>
+              <a:defRPr sz="1400" kern="1200">
+                <a:solidFill>
+                  <a:schemeClr val="tx1">
+                    <a:lumMod val="85000"/>
+                  </a:schemeClr>
+                </a:solidFill>
+                <a:latin typeface="+mn-lt"/>
+                <a:ea typeface="+mn-ea"/>
+                <a:cs typeface="+mn-cs"/>
+              </a:defRPr>
+            </a:lvl3pPr>
+            <a:lvl4pPr marL="777240" indent="-182880" algn="l" defTabSz="914400" rtl="0" eaLnBrk="1" latinLnBrk="0" hangingPunct="1">
+              <a:spcBef>
+                <a:spcPct val="20000"/>
+              </a:spcBef>
+              <a:buClr>
+                <a:schemeClr val="tx1">
+                  <a:lumMod val="50000"/>
+                  <a:lumOff val="50000"/>
+                </a:schemeClr>
+              </a:buClr>
+              <a:buFont typeface="Wingdings" pitchFamily="2" charset="2"/>
+              <a:buChar char="§"/>
+              <a:defRPr sz="1400" kern="1200">
+                <a:solidFill>
+                  <a:schemeClr val="tx1">
+                    <a:lumMod val="85000"/>
+                  </a:schemeClr>
+                </a:solidFill>
+                <a:latin typeface="+mn-lt"/>
+                <a:ea typeface="+mn-ea"/>
+                <a:cs typeface="+mn-cs"/>
+              </a:defRPr>
+            </a:lvl4pPr>
+            <a:lvl5pPr marL="960120" indent="-182880" algn="l" defTabSz="914400" rtl="0" eaLnBrk="1" latinLnBrk="0" hangingPunct="1">
+              <a:spcBef>
+                <a:spcPct val="20000"/>
+              </a:spcBef>
+              <a:buClr>
+                <a:schemeClr val="tx1">
+                  <a:lumMod val="50000"/>
+                  <a:lumOff val="50000"/>
+                </a:schemeClr>
+              </a:buClr>
+              <a:buFont typeface="Wingdings" pitchFamily="2" charset="2"/>
+              <a:buChar char="§"/>
+              <a:defRPr sz="1400" kern="1200">
+                <a:solidFill>
+                  <a:schemeClr val="tx1">
+                    <a:lumMod val="85000"/>
+                  </a:schemeClr>
+                </a:solidFill>
+                <a:latin typeface="+mn-lt"/>
+                <a:ea typeface="+mn-ea"/>
+                <a:cs typeface="+mn-cs"/>
+              </a:defRPr>
+            </a:lvl5pPr>
+            <a:lvl6pPr marL="1143000" indent="-182880" algn="l" defTabSz="914400" rtl="0" eaLnBrk="1" latinLnBrk="0" hangingPunct="1">
+              <a:spcBef>
+                <a:spcPts val="288"/>
+              </a:spcBef>
+              <a:buClr>
+                <a:schemeClr val="tx1">
+                  <a:lumMod val="50000"/>
+                  <a:lumOff val="50000"/>
+                </a:schemeClr>
+              </a:buClr>
+              <a:buFont typeface="Wingdings" pitchFamily="2" charset="2"/>
+              <a:buChar char="§"/>
+              <a:defRPr sz="1400" kern="1200" baseline="0">
+                <a:solidFill>
+                  <a:schemeClr val="tx1"/>
+                </a:solidFill>
+                <a:latin typeface="+mn-lt"/>
+                <a:ea typeface="+mn-ea"/>
+                <a:cs typeface="+mn-cs"/>
+              </a:defRPr>
+            </a:lvl6pPr>
+            <a:lvl7pPr marL="1325880" indent="-182880" algn="l" defTabSz="914400" rtl="0" eaLnBrk="1" latinLnBrk="0" hangingPunct="1">
+              <a:spcBef>
+                <a:spcPts val="288"/>
+              </a:spcBef>
+              <a:buClr>
+                <a:schemeClr val="tx1">
+                  <a:lumMod val="50000"/>
+                  <a:lumOff val="50000"/>
+                </a:schemeClr>
+              </a:buClr>
+              <a:buFont typeface="Wingdings" pitchFamily="2" charset="2"/>
+              <a:buChar char="§"/>
+              <a:defRPr sz="1400" kern="1200" baseline="0">
+                <a:solidFill>
+                  <a:schemeClr val="tx1"/>
+                </a:solidFill>
+                <a:latin typeface="+mn-lt"/>
+                <a:ea typeface="+mn-ea"/>
+                <a:cs typeface="+mn-cs"/>
+              </a:defRPr>
+            </a:lvl7pPr>
+            <a:lvl8pPr marL="1508760" indent="-182880" algn="l" defTabSz="914400" rtl="0" eaLnBrk="1" latinLnBrk="0" hangingPunct="1">
+              <a:spcBef>
+                <a:spcPts val="288"/>
+              </a:spcBef>
+              <a:buClr>
+                <a:schemeClr val="tx1">
+                  <a:lumMod val="50000"/>
+                  <a:lumOff val="50000"/>
+                </a:schemeClr>
+              </a:buClr>
+              <a:buFont typeface="Wingdings" pitchFamily="2" charset="2"/>
+              <a:buChar char="§"/>
+              <a:defRPr sz="1400" kern="1200" baseline="0">
+                <a:solidFill>
+                  <a:schemeClr val="tx1"/>
+                </a:solidFill>
+                <a:latin typeface="+mn-lt"/>
+                <a:ea typeface="+mn-ea"/>
+                <a:cs typeface="+mn-cs"/>
+              </a:defRPr>
+            </a:lvl8pPr>
+            <a:lvl9pPr marL="1691640" indent="-182880" algn="l" defTabSz="914400" rtl="0" eaLnBrk="1" latinLnBrk="0" hangingPunct="1">
+              <a:spcBef>
+                <a:spcPts val="288"/>
+              </a:spcBef>
+              <a:buClr>
+                <a:schemeClr val="tx1">
+                  <a:lumMod val="50000"/>
+                  <a:lumOff val="50000"/>
+                </a:schemeClr>
+              </a:buClr>
+              <a:buFont typeface="Wingdings" pitchFamily="2" charset="2"/>
+              <a:buChar char="§"/>
+              <a:defRPr sz="1400" kern="1200" baseline="0">
+                <a:solidFill>
+                  <a:schemeClr val="tx1"/>
+                </a:solidFill>
+                <a:latin typeface="+mn-lt"/>
+                <a:ea typeface="+mn-ea"/>
+                <a:cs typeface="+mn-cs"/>
+              </a:defRPr>
+            </a:lvl9pPr>
+          </a:lstStyle>
+          <a:p>
+            <a:pPr marL="0" indent="0">
+              <a:buNone/>
+            </a:pPr>
+            <a:r>
+              <a:rPr lang="en-GB" sz="3800" dirty="0" smtClean="0"/>
+              <a:t>A user </a:t>
+            </a:r>
+            <a:r>
+              <a:rPr lang="en-GB" sz="3800" dirty="0"/>
+              <a:t>journey/story/feature </a:t>
+            </a:r>
+            <a:r>
+              <a:rPr lang="en-GB" sz="3800" dirty="0" smtClean="0"/>
+              <a:t>would look </a:t>
+            </a:r>
+            <a:r>
+              <a:rPr lang="en-GB" sz="3800" dirty="0"/>
+              <a:t>like:</a:t>
+            </a:r>
+            <a:r>
+              <a:rPr lang="en-GB" sz="3200" dirty="0"/>
+              <a:t/>
+            </a:r>
+            <a:br>
+              <a:rPr lang="en-GB" sz="3200" dirty="0"/>
+            </a:br>
+            <a:r>
+              <a:rPr lang="en-GB" sz="3200" dirty="0"/>
+              <a:t/>
+            </a:r>
+            <a:br>
+              <a:rPr lang="en-GB" sz="3200" dirty="0"/>
+            </a:br>
+            <a:r>
+              <a:rPr lang="en-GB" sz="2800" dirty="0">
+                <a:solidFill>
+                  <a:schemeClr val="accent1"/>
+                </a:solidFill>
+              </a:rPr>
+              <a:t>@suite</a:t>
+            </a:r>
+          </a:p>
+          <a:p>
+            <a:pPr marL="0" indent="0">
+              <a:buNone/>
+            </a:pPr>
+            <a:r>
+              <a:rPr lang="en-GB" sz="2800" dirty="0">
+                <a:solidFill>
+                  <a:srgbClr val="EEB500"/>
+                </a:solidFill>
+              </a:rPr>
+              <a:t>Feature:</a:t>
+            </a:r>
+            <a:r>
+              <a:rPr lang="en-GB" sz="2800" dirty="0"/>
+              <a:t> Accessible user journey</a:t>
+            </a:r>
+          </a:p>
+          <a:p>
+            <a:pPr marL="0" indent="0">
+              <a:buNone/>
+            </a:pPr>
+            <a:r>
+              <a:rPr lang="en-GB" sz="2800" dirty="0"/>
+              <a:t>  As a </a:t>
+            </a:r>
+            <a:r>
+              <a:rPr lang="en-GB" sz="2800" dirty="0" smtClean="0"/>
+              <a:t>tester</a:t>
+            </a:r>
+            <a:endParaRPr lang="en-GB" sz="2800" dirty="0"/>
+          </a:p>
+          <a:p>
+            <a:pPr marL="0" indent="0">
+              <a:buNone/>
+            </a:pPr>
+            <a:r>
+              <a:rPr lang="en-GB" sz="2800" dirty="0"/>
+              <a:t>  I want to test </a:t>
+            </a:r>
+            <a:r>
+              <a:rPr lang="en-GB" sz="2800" dirty="0" smtClean="0"/>
+              <a:t>a web page </a:t>
+            </a:r>
+            <a:r>
+              <a:rPr lang="en-GB" sz="2800" dirty="0"/>
+              <a:t>for accessibility</a:t>
+            </a:r>
+          </a:p>
+          <a:p>
+            <a:pPr marL="0" indent="0">
+              <a:buNone/>
+            </a:pPr>
+            <a:r>
+              <a:rPr lang="en-GB" sz="2800" dirty="0"/>
+              <a:t>  So </a:t>
+            </a:r>
+            <a:r>
+              <a:rPr lang="en-GB" sz="2800" dirty="0" smtClean="0"/>
+              <a:t>that I </a:t>
+            </a:r>
+            <a:r>
+              <a:rPr lang="en-GB" sz="2800" dirty="0"/>
+              <a:t>can be sure that it does not contain critical accessibility issues</a:t>
+            </a:r>
+          </a:p>
+          <a:p>
+            <a:pPr marL="0" indent="0">
+              <a:buNone/>
+            </a:pPr>
+            <a:endParaRPr lang="en-GB" sz="2800" dirty="0"/>
+          </a:p>
+          <a:p>
+            <a:pPr marL="0" indent="0">
+              <a:buNone/>
+            </a:pPr>
+            <a:r>
+              <a:rPr lang="en-GB" sz="2800" dirty="0"/>
+              <a:t>  </a:t>
+            </a:r>
+            <a:r>
+              <a:rPr lang="en-GB" sz="2800" dirty="0">
+                <a:solidFill>
+                  <a:srgbClr val="EEB500"/>
+                </a:solidFill>
+              </a:rPr>
+              <a:t>Scenario: </a:t>
+            </a:r>
+            <a:r>
+              <a:rPr lang="en-GB" sz="2800" dirty="0"/>
+              <a:t>Test accessibility for Google.com</a:t>
+            </a:r>
+          </a:p>
+          <a:p>
+            <a:pPr marL="0" indent="0">
+              <a:buNone/>
+            </a:pPr>
+            <a:r>
+              <a:rPr lang="en-GB" sz="2800" dirty="0"/>
+              <a:t>    </a:t>
+            </a:r>
+            <a:r>
+              <a:rPr lang="en-GB" sz="2800" dirty="0">
+                <a:solidFill>
+                  <a:srgbClr val="EEB500"/>
+                </a:solidFill>
+              </a:rPr>
+              <a:t>Given</a:t>
+            </a:r>
+            <a:r>
+              <a:rPr lang="en-GB" sz="2800" dirty="0"/>
+              <a:t> user navigates to </a:t>
+            </a:r>
+            <a:r>
+              <a:rPr lang="en-GB" sz="2800" dirty="0">
+                <a:solidFill>
+                  <a:schemeClr val="tx1"/>
+                </a:solidFill>
+              </a:rPr>
+              <a:t>'</a:t>
+            </a:r>
+            <a:r>
+              <a:rPr lang="en-GB" sz="2800" dirty="0">
+                <a:solidFill>
+                  <a:srgbClr val="00B0F0"/>
+                </a:solidFill>
+              </a:rPr>
+              <a:t>http://google.com</a:t>
+            </a:r>
+            <a:r>
+              <a:rPr lang="en-GB" sz="2800" dirty="0"/>
+              <a:t>' web page</a:t>
+            </a:r>
+          </a:p>
+          <a:p>
+            <a:pPr marL="0" indent="0">
+              <a:buNone/>
+            </a:pPr>
+            <a:r>
+              <a:rPr lang="en-GB" sz="2800" dirty="0"/>
+              <a:t>    </a:t>
+            </a:r>
+            <a:r>
+              <a:rPr lang="en-GB" sz="2800" dirty="0">
+                <a:solidFill>
+                  <a:srgbClr val="EEB500"/>
+                </a:solidFill>
+              </a:rPr>
+              <a:t>Then</a:t>
+            </a:r>
+            <a:r>
+              <a:rPr lang="en-GB" sz="2800" dirty="0"/>
+              <a:t> accessibility test is executed on the open </a:t>
+            </a:r>
+            <a:r>
+              <a:rPr lang="en-GB" sz="2800" dirty="0" smtClean="0"/>
+              <a:t>page</a:t>
+            </a:r>
+            <a:endParaRPr lang="en-GB" sz="2800" dirty="0"/>
+          </a:p>
+        </p:txBody>
+      </p:sp>
+      <p:sp>
+        <p:nvSpPr>
+          <p:cNvPr id="7" name="Title"/>
+          <p:cNvSpPr>
+            <a:spLocks noGrp="1"/>
+          </p:cNvSpPr>
+          <p:nvPr>
+            <p:ph type="title"/>
+          </p:nvPr>
+        </p:nvSpPr>
+        <p:spPr>
+          <a:xfrm>
+            <a:off x="457200" y="381000"/>
+            <a:ext cx="8001000" cy="609600"/>
+          </a:xfrm>
+        </p:spPr>
+        <p:txBody>
+          <a:bodyPr>
+            <a:noAutofit/>
+          </a:bodyPr>
+          <a:lstStyle/>
+          <a:p>
+            <a:r>
+              <a:rPr lang="en-GB" sz="4000" dirty="0" smtClean="0"/>
+              <a:t>User journey</a:t>
+            </a:r>
+            <a:endParaRPr lang="en-GB" sz="4000" dirty="0"/>
+          </a:p>
+        </p:txBody>
+      </p:sp>
+    </p:spTree>
+    <p:extLst>
+      <p:ext uri="{BB962C8B-B14F-4D97-AF65-F5344CB8AC3E}">
+        <p14:creationId xmlns:p14="http://schemas.microsoft.com/office/powerpoint/2010/main" val="2935976058"/>
+      </p:ext>
+    </p:extLst>
+  </p:cSld>
+  <p:clrMapOvr>
+    <a:masterClrMapping/>
+  </p:clrMapOvr>
+</p:sld>
+</file>
+
+<file path=ppt/slides/slide14.xml><?xml version="1.0" encoding="utf-8"?>
+<p:sld xmlns:a="http://schemas.openxmlformats.org/drawingml/2006/main" xmlns:r="http://schemas.openxmlformats.org/officeDocument/2006/relationships" xmlns:p="http://schemas.openxmlformats.org/presentationml/2006/main">
+  <p:cSld>
+    <p:spTree>
+      <p:nvGrpSpPr>
+        <p:cNvPr id="1" name=""/>
+        <p:cNvGrpSpPr/>
+        <p:nvPr/>
+      </p:nvGrpSpPr>
+      <p:grpSpPr>
+        <a:xfrm>
+          <a:off x="0" y="0"/>
+          <a:ext cx="0" cy="0"/>
+          <a:chOff x="0" y="0"/>
+          <a:chExt cx="0" cy="0"/>
+        </a:xfrm>
+      </p:grpSpPr>
+      <p:sp>
+        <p:nvSpPr>
+          <p:cNvPr id="9" name="Subtitle"/>
+          <p:cNvSpPr txBox="1">
+            <a:spLocks/>
+          </p:cNvSpPr>
+          <p:nvPr/>
+        </p:nvSpPr>
+        <p:spPr>
+          <a:xfrm>
+            <a:off x="533400" y="990600"/>
+            <a:ext cx="7848600" cy="5562600"/>
+          </a:xfrm>
+          <a:prstGeom prst="rect">
+            <a:avLst/>
+          </a:prstGeom>
+        </p:spPr>
+        <p:txBody>
+          <a:bodyPr vert="horz" lIns="91440" tIns="45720" rIns="91440" bIns="45720" rtlCol="0" anchor="ctr">
+            <a:normAutofit/>
+          </a:bodyPr>
+          <a:lstStyle>
+            <a:lvl1pPr marL="182880" indent="-182880" algn="l" defTabSz="914400" rtl="0" eaLnBrk="1" latinLnBrk="0" hangingPunct="1">
+              <a:spcBef>
+                <a:spcPct val="20000"/>
+              </a:spcBef>
+              <a:buClr>
+                <a:schemeClr val="tx1">
+                  <a:lumMod val="50000"/>
+                  <a:lumOff val="50000"/>
+                </a:schemeClr>
+              </a:buClr>
+              <a:buFont typeface="Wingdings" pitchFamily="2" charset="2"/>
+              <a:buChar char="§"/>
+              <a:defRPr sz="1800" kern="1200">
+                <a:solidFill>
+                  <a:schemeClr val="tx1">
+                    <a:lumMod val="85000"/>
+                  </a:schemeClr>
+                </a:solidFill>
+                <a:latin typeface="+mn-lt"/>
+                <a:ea typeface="+mn-ea"/>
+                <a:cs typeface="+mn-cs"/>
+              </a:defRPr>
+            </a:lvl1pPr>
+            <a:lvl2pPr marL="411480" indent="-182880" algn="l" defTabSz="914400" rtl="0" eaLnBrk="1" latinLnBrk="0" hangingPunct="1">
+              <a:spcBef>
+                <a:spcPct val="20000"/>
+              </a:spcBef>
+              <a:buClr>
+                <a:schemeClr val="tx1">
+                  <a:lumMod val="50000"/>
+                  <a:lumOff val="50000"/>
+                </a:schemeClr>
+              </a:buClr>
+              <a:buFont typeface="Wingdings" pitchFamily="2" charset="2"/>
+              <a:buChar char="§"/>
+              <a:defRPr sz="1400" kern="1200">
+                <a:solidFill>
+                  <a:schemeClr val="tx1">
+                    <a:lumMod val="85000"/>
+                  </a:schemeClr>
+                </a:solidFill>
+                <a:latin typeface="+mn-lt"/>
+                <a:ea typeface="+mn-ea"/>
+                <a:cs typeface="+mn-cs"/>
+              </a:defRPr>
+            </a:lvl2pPr>
+            <a:lvl3pPr marL="594360" indent="-182880" algn="l" defTabSz="914400" rtl="0" eaLnBrk="1" latinLnBrk="0" hangingPunct="1">
+              <a:spcBef>
+                <a:spcPct val="20000"/>
+              </a:spcBef>
+              <a:buClr>
+                <a:schemeClr val="tx1">
+                  <a:lumMod val="50000"/>
+                  <a:lumOff val="50000"/>
+                </a:schemeClr>
+              </a:buClr>
+              <a:buFont typeface="Wingdings" pitchFamily="2" charset="2"/>
+              <a:buChar char="§"/>
+              <a:defRPr sz="1400" kern="1200">
+                <a:solidFill>
+                  <a:schemeClr val="tx1">
+                    <a:lumMod val="85000"/>
+                  </a:schemeClr>
+                </a:solidFill>
+                <a:latin typeface="+mn-lt"/>
+                <a:ea typeface="+mn-ea"/>
+                <a:cs typeface="+mn-cs"/>
+              </a:defRPr>
+            </a:lvl3pPr>
+            <a:lvl4pPr marL="777240" indent="-182880" algn="l" defTabSz="914400" rtl="0" eaLnBrk="1" latinLnBrk="0" hangingPunct="1">
+              <a:spcBef>
+                <a:spcPct val="20000"/>
+              </a:spcBef>
+              <a:buClr>
+                <a:schemeClr val="tx1">
+                  <a:lumMod val="50000"/>
+                  <a:lumOff val="50000"/>
+                </a:schemeClr>
+              </a:buClr>
+              <a:buFont typeface="Wingdings" pitchFamily="2" charset="2"/>
+              <a:buChar char="§"/>
+              <a:defRPr sz="1400" kern="1200">
+                <a:solidFill>
+                  <a:schemeClr val="tx1">
+                    <a:lumMod val="85000"/>
+                  </a:schemeClr>
+                </a:solidFill>
+                <a:latin typeface="+mn-lt"/>
+                <a:ea typeface="+mn-ea"/>
+                <a:cs typeface="+mn-cs"/>
+              </a:defRPr>
+            </a:lvl4pPr>
+            <a:lvl5pPr marL="960120" indent="-182880" algn="l" defTabSz="914400" rtl="0" eaLnBrk="1" latinLnBrk="0" hangingPunct="1">
+              <a:spcBef>
+                <a:spcPct val="20000"/>
+              </a:spcBef>
+              <a:buClr>
+                <a:schemeClr val="tx1">
+                  <a:lumMod val="50000"/>
+                  <a:lumOff val="50000"/>
+                </a:schemeClr>
+              </a:buClr>
+              <a:buFont typeface="Wingdings" pitchFamily="2" charset="2"/>
+              <a:buChar char="§"/>
+              <a:defRPr sz="1400" kern="1200">
+                <a:solidFill>
+                  <a:schemeClr val="tx1">
+                    <a:lumMod val="85000"/>
+                  </a:schemeClr>
+                </a:solidFill>
+                <a:latin typeface="+mn-lt"/>
+                <a:ea typeface="+mn-ea"/>
+                <a:cs typeface="+mn-cs"/>
+              </a:defRPr>
+            </a:lvl5pPr>
+            <a:lvl6pPr marL="1143000" indent="-182880" algn="l" defTabSz="914400" rtl="0" eaLnBrk="1" latinLnBrk="0" hangingPunct="1">
+              <a:spcBef>
+                <a:spcPts val="288"/>
+              </a:spcBef>
+              <a:buClr>
+                <a:schemeClr val="tx1">
+                  <a:lumMod val="50000"/>
+                  <a:lumOff val="50000"/>
+                </a:schemeClr>
+              </a:buClr>
+              <a:buFont typeface="Wingdings" pitchFamily="2" charset="2"/>
+              <a:buChar char="§"/>
+              <a:defRPr sz="1400" kern="1200" baseline="0">
+                <a:solidFill>
+                  <a:schemeClr val="tx1"/>
+                </a:solidFill>
+                <a:latin typeface="+mn-lt"/>
+                <a:ea typeface="+mn-ea"/>
+                <a:cs typeface="+mn-cs"/>
+              </a:defRPr>
+            </a:lvl6pPr>
+            <a:lvl7pPr marL="1325880" indent="-182880" algn="l" defTabSz="914400" rtl="0" eaLnBrk="1" latinLnBrk="0" hangingPunct="1">
+              <a:spcBef>
+                <a:spcPts val="288"/>
+              </a:spcBef>
+              <a:buClr>
+                <a:schemeClr val="tx1">
+                  <a:lumMod val="50000"/>
+                  <a:lumOff val="50000"/>
+                </a:schemeClr>
+              </a:buClr>
+              <a:buFont typeface="Wingdings" pitchFamily="2" charset="2"/>
+              <a:buChar char="§"/>
+              <a:defRPr sz="1400" kern="1200" baseline="0">
+                <a:solidFill>
+                  <a:schemeClr val="tx1"/>
+                </a:solidFill>
+                <a:latin typeface="+mn-lt"/>
+                <a:ea typeface="+mn-ea"/>
+                <a:cs typeface="+mn-cs"/>
+              </a:defRPr>
+            </a:lvl7pPr>
+            <a:lvl8pPr marL="1508760" indent="-182880" algn="l" defTabSz="914400" rtl="0" eaLnBrk="1" latinLnBrk="0" hangingPunct="1">
+              <a:spcBef>
+                <a:spcPts val="288"/>
+              </a:spcBef>
+              <a:buClr>
+                <a:schemeClr val="tx1">
+                  <a:lumMod val="50000"/>
+                  <a:lumOff val="50000"/>
+                </a:schemeClr>
+              </a:buClr>
+              <a:buFont typeface="Wingdings" pitchFamily="2" charset="2"/>
+              <a:buChar char="§"/>
+              <a:defRPr sz="1400" kern="1200" baseline="0">
+                <a:solidFill>
+                  <a:schemeClr val="tx1"/>
+                </a:solidFill>
+                <a:latin typeface="+mn-lt"/>
+                <a:ea typeface="+mn-ea"/>
+                <a:cs typeface="+mn-cs"/>
+              </a:defRPr>
+            </a:lvl8pPr>
+            <a:lvl9pPr marL="1691640" indent="-182880" algn="l" defTabSz="914400" rtl="0" eaLnBrk="1" latinLnBrk="0" hangingPunct="1">
+              <a:spcBef>
+                <a:spcPts val="288"/>
+              </a:spcBef>
+              <a:buClr>
+                <a:schemeClr val="tx1">
+                  <a:lumMod val="50000"/>
+                  <a:lumOff val="50000"/>
+                </a:schemeClr>
+              </a:buClr>
+              <a:buFont typeface="Wingdings" pitchFamily="2" charset="2"/>
+              <a:buChar char="§"/>
+              <a:defRPr sz="1400" kern="1200" baseline="0">
+                <a:solidFill>
+                  <a:schemeClr val="tx1"/>
+                </a:solidFill>
+                <a:latin typeface="+mn-lt"/>
+                <a:ea typeface="+mn-ea"/>
+                <a:cs typeface="+mn-cs"/>
+              </a:defRPr>
+            </a:lvl9pPr>
+          </a:lstStyle>
+          <a:p>
+            <a:pPr marL="0" indent="0">
+              <a:buNone/>
+            </a:pPr>
+            <a:r>
+              <a:rPr lang="en-GB" sz="4000" dirty="0" smtClean="0"/>
+              <a:t>Our journey consists of a step that opens the given URL in a browser:</a:t>
+            </a:r>
+          </a:p>
+          <a:p>
+            <a:pPr marL="0" indent="0">
+              <a:buNone/>
+            </a:pPr>
+            <a:r>
+              <a:rPr lang="en-GB" sz="3200" dirty="0"/>
+              <a:t/>
+            </a:r>
+            <a:br>
+              <a:rPr lang="en-GB" sz="3200" dirty="0"/>
+            </a:br>
+            <a:r>
+              <a:rPr lang="en-GB" sz="2600" dirty="0">
+                <a:solidFill>
+                  <a:srgbClr val="EEB500"/>
+                </a:solidFill>
+              </a:rPr>
+              <a:t>Given</a:t>
+            </a:r>
+            <a:r>
+              <a:rPr lang="en-GB" sz="2600" dirty="0"/>
+              <a:t>( """^user navigates to '</a:t>
+            </a:r>
+            <a:r>
+              <a:rPr lang="en-GB" sz="2600" dirty="0">
+                <a:solidFill>
+                  <a:srgbClr val="00B0F0"/>
+                </a:solidFill>
+              </a:rPr>
+              <a:t>(.*)</a:t>
+            </a:r>
+            <a:r>
+              <a:rPr lang="en-GB" sz="2600" dirty="0"/>
+              <a:t>' web page$""") {</a:t>
+            </a:r>
+          </a:p>
+          <a:p>
+            <a:pPr marL="0" indent="0">
+              <a:buNone/>
+            </a:pPr>
+            <a:r>
+              <a:rPr lang="en-GB" sz="2600" dirty="0"/>
+              <a:t>    (</a:t>
+            </a:r>
+            <a:r>
+              <a:rPr lang="en-GB" sz="2600" dirty="0" err="1">
+                <a:solidFill>
+                  <a:srgbClr val="00B0F0"/>
+                </a:solidFill>
+              </a:rPr>
+              <a:t>userUrl</a:t>
+            </a:r>
+            <a:r>
+              <a:rPr lang="en-GB" sz="2600" dirty="0"/>
+              <a:t>: String) =&gt; </a:t>
+            </a:r>
+            <a:endParaRPr lang="en-GB" sz="2600" dirty="0" smtClean="0"/>
+          </a:p>
+          <a:p>
+            <a:pPr marL="0" indent="0">
+              <a:buNone/>
+            </a:pPr>
+            <a:r>
+              <a:rPr lang="en-GB" sz="2600" dirty="0"/>
+              <a:t> </a:t>
+            </a:r>
+            <a:r>
+              <a:rPr lang="en-GB" sz="2600" dirty="0" smtClean="0"/>
+              <a:t>     </a:t>
+            </a:r>
+            <a:r>
+              <a:rPr lang="en-GB" sz="2600" dirty="0" err="1" smtClean="0"/>
+              <a:t>withCurrentDriver</a:t>
+            </a:r>
+            <a:r>
+              <a:rPr lang="en-GB" sz="2600" dirty="0" smtClean="0"/>
+              <a:t> </a:t>
+            </a:r>
+            <a:r>
+              <a:rPr lang="en-GB" sz="2600" dirty="0"/>
+              <a:t>{ implicit </a:t>
+            </a:r>
+            <a:r>
+              <a:rPr lang="en-GB" sz="2600" dirty="0" err="1"/>
+              <a:t>webDriver</a:t>
+            </a:r>
+            <a:r>
+              <a:rPr lang="en-GB" sz="2600" dirty="0"/>
+              <a:t> =&gt;</a:t>
+            </a:r>
+          </a:p>
+          <a:p>
+            <a:pPr marL="0" indent="0">
+              <a:buNone/>
+            </a:pPr>
+            <a:r>
+              <a:rPr lang="en-GB" sz="2600" dirty="0"/>
+              <a:t>      </a:t>
+            </a:r>
+            <a:r>
+              <a:rPr lang="en-GB" sz="2600" dirty="0" smtClean="0"/>
+              <a:t>  </a:t>
+            </a:r>
+            <a:r>
+              <a:rPr lang="en-GB" sz="2600" dirty="0" err="1" smtClean="0"/>
+              <a:t>webDriver</a:t>
+            </a:r>
+            <a:r>
+              <a:rPr lang="en-GB" sz="2600" dirty="0" err="1" smtClean="0">
+                <a:solidFill>
+                  <a:schemeClr val="tx1"/>
+                </a:solidFill>
+              </a:rPr>
+              <a:t>.get</a:t>
+            </a:r>
+            <a:r>
+              <a:rPr lang="en-GB" sz="2600" dirty="0" smtClean="0"/>
+              <a:t>(</a:t>
+            </a:r>
+            <a:r>
+              <a:rPr lang="en-GB" sz="2600" dirty="0" err="1" smtClean="0">
+                <a:solidFill>
+                  <a:srgbClr val="00B0F0"/>
+                </a:solidFill>
+              </a:rPr>
+              <a:t>userUrl</a:t>
+            </a:r>
+            <a:r>
+              <a:rPr lang="en-GB" sz="2600" dirty="0"/>
+              <a:t>)</a:t>
+            </a:r>
+          </a:p>
+          <a:p>
+            <a:pPr marL="0" indent="0">
+              <a:buNone/>
+            </a:pPr>
+            <a:r>
+              <a:rPr lang="en-GB" sz="2600" dirty="0"/>
+              <a:t>    }</a:t>
+            </a:r>
+          </a:p>
+          <a:p>
+            <a:pPr marL="0" indent="0">
+              <a:buNone/>
+            </a:pPr>
+            <a:r>
+              <a:rPr lang="en-GB" sz="2600" dirty="0"/>
+              <a:t>  </a:t>
+            </a:r>
+            <a:r>
+              <a:rPr lang="en-GB" sz="2600" dirty="0" smtClean="0"/>
+              <a:t>}</a:t>
+            </a:r>
+          </a:p>
+          <a:p>
+            <a:pPr marL="0" indent="0">
+              <a:buNone/>
+            </a:pPr>
+            <a:endParaRPr lang="en-GB" sz="3200" dirty="0"/>
+          </a:p>
+        </p:txBody>
+      </p:sp>
+      <p:sp>
+        <p:nvSpPr>
+          <p:cNvPr id="7" name="Title"/>
+          <p:cNvSpPr>
+            <a:spLocks noGrp="1"/>
+          </p:cNvSpPr>
+          <p:nvPr>
+            <p:ph type="title"/>
+          </p:nvPr>
+        </p:nvSpPr>
+        <p:spPr>
+          <a:xfrm>
+            <a:off x="457200" y="381000"/>
+            <a:ext cx="8001000" cy="609600"/>
+          </a:xfrm>
+        </p:spPr>
+        <p:txBody>
+          <a:bodyPr>
+            <a:noAutofit/>
+          </a:bodyPr>
+          <a:lstStyle/>
+          <a:p>
+            <a:r>
+              <a:rPr lang="en-GB" sz="4000" dirty="0" smtClean="0"/>
+              <a:t>Code for journey</a:t>
+            </a:r>
+            <a:endParaRPr lang="en-GB" sz="4000" dirty="0"/>
+          </a:p>
+        </p:txBody>
+      </p:sp>
+    </p:spTree>
+    <p:extLst>
+      <p:ext uri="{BB962C8B-B14F-4D97-AF65-F5344CB8AC3E}">
+        <p14:creationId xmlns:p14="http://schemas.microsoft.com/office/powerpoint/2010/main" val="3336395174"/>
+      </p:ext>
+    </p:extLst>
+  </p:cSld>
+  <p:clrMapOvr>
+    <a:masterClrMapping/>
+  </p:clrMapOvr>
+</p:sld>
+</file>
+
+<file path=ppt/slides/slide15.xml><?xml version="1.0" encoding="utf-8"?>
+<p:sld xmlns:a="http://schemas.openxmlformats.org/drawingml/2006/main" xmlns:r="http://schemas.openxmlformats.org/officeDocument/2006/relationships" xmlns:p="http://schemas.openxmlformats.org/presentationml/2006/main">
+  <p:cSld>
+    <p:spTree>
+      <p:nvGrpSpPr>
+        <p:cNvPr id="1" name=""/>
+        <p:cNvGrpSpPr/>
+        <p:nvPr/>
+      </p:nvGrpSpPr>
+      <p:grpSpPr>
+        <a:xfrm>
+          <a:off x="0" y="0"/>
+          <a:ext cx="0" cy="0"/>
+          <a:chOff x="0" y="0"/>
+          <a:chExt cx="0" cy="0"/>
+        </a:xfrm>
+      </p:grpSpPr>
+      <p:sp>
+        <p:nvSpPr>
+          <p:cNvPr id="9" name="Subtitle"/>
+          <p:cNvSpPr txBox="1">
+            <a:spLocks/>
+          </p:cNvSpPr>
+          <p:nvPr/>
+        </p:nvSpPr>
+        <p:spPr>
+          <a:xfrm>
+            <a:off x="533400" y="1066800"/>
+            <a:ext cx="7848600" cy="4724400"/>
+          </a:xfrm>
+          <a:prstGeom prst="rect">
+            <a:avLst/>
+          </a:prstGeom>
+        </p:spPr>
+        <p:txBody>
+          <a:bodyPr vert="horz" lIns="91440" tIns="45720" rIns="91440" bIns="45720" rtlCol="0" anchor="ctr">
+            <a:normAutofit fontScale="32500" lnSpcReduction="20000"/>
+          </a:bodyPr>
+          <a:lstStyle>
+            <a:lvl1pPr marL="182880" indent="-182880" algn="l" defTabSz="914400" rtl="0" eaLnBrk="1" latinLnBrk="0" hangingPunct="1">
+              <a:spcBef>
+                <a:spcPct val="20000"/>
+              </a:spcBef>
+              <a:buClr>
+                <a:schemeClr val="tx1">
+                  <a:lumMod val="50000"/>
+                  <a:lumOff val="50000"/>
+                </a:schemeClr>
+              </a:buClr>
+              <a:buFont typeface="Wingdings" pitchFamily="2" charset="2"/>
+              <a:buChar char="§"/>
+              <a:defRPr sz="1800" kern="1200">
+                <a:solidFill>
+                  <a:schemeClr val="tx1">
+                    <a:lumMod val="85000"/>
+                  </a:schemeClr>
+                </a:solidFill>
+                <a:latin typeface="+mn-lt"/>
+                <a:ea typeface="+mn-ea"/>
+                <a:cs typeface="+mn-cs"/>
+              </a:defRPr>
+            </a:lvl1pPr>
+            <a:lvl2pPr marL="411480" indent="-182880" algn="l" defTabSz="914400" rtl="0" eaLnBrk="1" latinLnBrk="0" hangingPunct="1">
+              <a:spcBef>
+                <a:spcPct val="20000"/>
+              </a:spcBef>
+              <a:buClr>
+                <a:schemeClr val="tx1">
+                  <a:lumMod val="50000"/>
+                  <a:lumOff val="50000"/>
+                </a:schemeClr>
+              </a:buClr>
+              <a:buFont typeface="Wingdings" pitchFamily="2" charset="2"/>
+              <a:buChar char="§"/>
+              <a:defRPr sz="1400" kern="1200">
+                <a:solidFill>
+                  <a:schemeClr val="tx1">
+                    <a:lumMod val="85000"/>
+                  </a:schemeClr>
+                </a:solidFill>
+                <a:latin typeface="+mn-lt"/>
+                <a:ea typeface="+mn-ea"/>
+                <a:cs typeface="+mn-cs"/>
+              </a:defRPr>
+            </a:lvl2pPr>
+            <a:lvl3pPr marL="594360" indent="-182880" algn="l" defTabSz="914400" rtl="0" eaLnBrk="1" latinLnBrk="0" hangingPunct="1">
+              <a:spcBef>
+                <a:spcPct val="20000"/>
+              </a:spcBef>
+              <a:buClr>
+                <a:schemeClr val="tx1">
+                  <a:lumMod val="50000"/>
+                  <a:lumOff val="50000"/>
+                </a:schemeClr>
+              </a:buClr>
+              <a:buFont typeface="Wingdings" pitchFamily="2" charset="2"/>
+              <a:buChar char="§"/>
+              <a:defRPr sz="1400" kern="1200">
+                <a:solidFill>
+                  <a:schemeClr val="tx1">
+                    <a:lumMod val="85000"/>
+                  </a:schemeClr>
+                </a:solidFill>
+                <a:latin typeface="+mn-lt"/>
+                <a:ea typeface="+mn-ea"/>
+                <a:cs typeface="+mn-cs"/>
+              </a:defRPr>
+            </a:lvl3pPr>
+            <a:lvl4pPr marL="777240" indent="-182880" algn="l" defTabSz="914400" rtl="0" eaLnBrk="1" latinLnBrk="0" hangingPunct="1">
+              <a:spcBef>
+                <a:spcPct val="20000"/>
+              </a:spcBef>
+              <a:buClr>
+                <a:schemeClr val="tx1">
+                  <a:lumMod val="50000"/>
+                  <a:lumOff val="50000"/>
+                </a:schemeClr>
+              </a:buClr>
+              <a:buFont typeface="Wingdings" pitchFamily="2" charset="2"/>
+              <a:buChar char="§"/>
+              <a:defRPr sz="1400" kern="1200">
+                <a:solidFill>
+                  <a:schemeClr val="tx1">
+                    <a:lumMod val="85000"/>
+                  </a:schemeClr>
+                </a:solidFill>
+                <a:latin typeface="+mn-lt"/>
+                <a:ea typeface="+mn-ea"/>
+                <a:cs typeface="+mn-cs"/>
+              </a:defRPr>
+            </a:lvl4pPr>
+            <a:lvl5pPr marL="960120" indent="-182880" algn="l" defTabSz="914400" rtl="0" eaLnBrk="1" latinLnBrk="0" hangingPunct="1">
+              <a:spcBef>
+                <a:spcPct val="20000"/>
+              </a:spcBef>
+              <a:buClr>
+                <a:schemeClr val="tx1">
+                  <a:lumMod val="50000"/>
+                  <a:lumOff val="50000"/>
+                </a:schemeClr>
+              </a:buClr>
+              <a:buFont typeface="Wingdings" pitchFamily="2" charset="2"/>
+              <a:buChar char="§"/>
+              <a:defRPr sz="1400" kern="1200">
+                <a:solidFill>
+                  <a:schemeClr val="tx1">
+                    <a:lumMod val="85000"/>
+                  </a:schemeClr>
+                </a:solidFill>
+                <a:latin typeface="+mn-lt"/>
+                <a:ea typeface="+mn-ea"/>
+                <a:cs typeface="+mn-cs"/>
+              </a:defRPr>
+            </a:lvl5pPr>
+            <a:lvl6pPr marL="1143000" indent="-182880" algn="l" defTabSz="914400" rtl="0" eaLnBrk="1" latinLnBrk="0" hangingPunct="1">
+              <a:spcBef>
+                <a:spcPts val="288"/>
+              </a:spcBef>
+              <a:buClr>
+                <a:schemeClr val="tx1">
+                  <a:lumMod val="50000"/>
+                  <a:lumOff val="50000"/>
+                </a:schemeClr>
+              </a:buClr>
+              <a:buFont typeface="Wingdings" pitchFamily="2" charset="2"/>
+              <a:buChar char="§"/>
+              <a:defRPr sz="1400" kern="1200" baseline="0">
+                <a:solidFill>
+                  <a:schemeClr val="tx1"/>
+                </a:solidFill>
+                <a:latin typeface="+mn-lt"/>
+                <a:ea typeface="+mn-ea"/>
+                <a:cs typeface="+mn-cs"/>
+              </a:defRPr>
+            </a:lvl6pPr>
+            <a:lvl7pPr marL="1325880" indent="-182880" algn="l" defTabSz="914400" rtl="0" eaLnBrk="1" latinLnBrk="0" hangingPunct="1">
+              <a:spcBef>
+                <a:spcPts val="288"/>
+              </a:spcBef>
+              <a:buClr>
+                <a:schemeClr val="tx1">
+                  <a:lumMod val="50000"/>
+                  <a:lumOff val="50000"/>
+                </a:schemeClr>
+              </a:buClr>
+              <a:buFont typeface="Wingdings" pitchFamily="2" charset="2"/>
+              <a:buChar char="§"/>
+              <a:defRPr sz="1400" kern="1200" baseline="0">
+                <a:solidFill>
+                  <a:schemeClr val="tx1"/>
+                </a:solidFill>
+                <a:latin typeface="+mn-lt"/>
+                <a:ea typeface="+mn-ea"/>
+                <a:cs typeface="+mn-cs"/>
+              </a:defRPr>
+            </a:lvl7pPr>
+            <a:lvl8pPr marL="1508760" indent="-182880" algn="l" defTabSz="914400" rtl="0" eaLnBrk="1" latinLnBrk="0" hangingPunct="1">
+              <a:spcBef>
+                <a:spcPts val="288"/>
+              </a:spcBef>
+              <a:buClr>
+                <a:schemeClr val="tx1">
+                  <a:lumMod val="50000"/>
+                  <a:lumOff val="50000"/>
+                </a:schemeClr>
+              </a:buClr>
+              <a:buFont typeface="Wingdings" pitchFamily="2" charset="2"/>
+              <a:buChar char="§"/>
+              <a:defRPr sz="1400" kern="1200" baseline="0">
+                <a:solidFill>
+                  <a:schemeClr val="tx1"/>
+                </a:solidFill>
+                <a:latin typeface="+mn-lt"/>
+                <a:ea typeface="+mn-ea"/>
+                <a:cs typeface="+mn-cs"/>
+              </a:defRPr>
+            </a:lvl8pPr>
+            <a:lvl9pPr marL="1691640" indent="-182880" algn="l" defTabSz="914400" rtl="0" eaLnBrk="1" latinLnBrk="0" hangingPunct="1">
+              <a:spcBef>
+                <a:spcPts val="288"/>
+              </a:spcBef>
+              <a:buClr>
+                <a:schemeClr val="tx1">
+                  <a:lumMod val="50000"/>
+                  <a:lumOff val="50000"/>
+                </a:schemeClr>
+              </a:buClr>
+              <a:buFont typeface="Wingdings" pitchFamily="2" charset="2"/>
+              <a:buChar char="§"/>
+              <a:defRPr sz="1400" kern="1200" baseline="0">
+                <a:solidFill>
+                  <a:schemeClr val="tx1"/>
+                </a:solidFill>
+                <a:latin typeface="+mn-lt"/>
+                <a:ea typeface="+mn-ea"/>
+                <a:cs typeface="+mn-cs"/>
+              </a:defRPr>
+            </a:lvl9pPr>
+          </a:lstStyle>
+          <a:p>
+            <a:pPr marL="0" indent="0">
+              <a:buNone/>
+            </a:pPr>
+            <a:r>
+              <a:rPr lang="en-GB" sz="6200" dirty="0" smtClean="0"/>
+              <a:t>Tests are executed with the help of </a:t>
+            </a:r>
+            <a:r>
+              <a:rPr lang="en-GB" sz="6200" dirty="0" err="1" smtClean="0"/>
+              <a:t>JavascriptExecutor</a:t>
+            </a:r>
+            <a:r>
+              <a:rPr lang="en-GB" sz="6200" dirty="0" smtClean="0"/>
+              <a:t>:</a:t>
+            </a:r>
+          </a:p>
+          <a:p>
+            <a:pPr marL="0" indent="0">
+              <a:buNone/>
+            </a:pPr>
+            <a:endParaRPr lang="en-GB" sz="6200" dirty="0"/>
+          </a:p>
+          <a:p>
+            <a:pPr marL="0" indent="0">
+              <a:buNone/>
+            </a:pPr>
+            <a:r>
+              <a:rPr lang="en-GB" sz="4900" dirty="0" smtClean="0">
+                <a:solidFill>
+                  <a:srgbClr val="EEB500"/>
+                </a:solidFill>
+              </a:rPr>
+              <a:t>Then</a:t>
+            </a:r>
+            <a:r>
+              <a:rPr lang="en-GB" sz="4900" dirty="0"/>
+              <a:t>( """^accessibility test is executed on the open page$""") {</a:t>
+            </a:r>
+          </a:p>
+          <a:p>
+            <a:pPr marL="0" indent="0">
+              <a:buNone/>
+            </a:pPr>
+            <a:r>
+              <a:rPr lang="en-GB" sz="3700" dirty="0"/>
+              <a:t>    () =&gt; </a:t>
+            </a:r>
+            <a:r>
+              <a:rPr lang="en-GB" sz="3700" dirty="0" err="1"/>
+              <a:t>withCurrentDriver</a:t>
+            </a:r>
+            <a:r>
+              <a:rPr lang="en-GB" sz="3700" dirty="0"/>
+              <a:t> { implicit </a:t>
+            </a:r>
+            <a:r>
+              <a:rPr lang="en-GB" sz="3700" dirty="0" err="1"/>
+              <a:t>webDriver</a:t>
+            </a:r>
+            <a:r>
+              <a:rPr lang="en-GB" sz="3700" dirty="0"/>
+              <a:t> =&gt;</a:t>
+            </a:r>
+          </a:p>
+          <a:p>
+            <a:pPr marL="0" indent="0">
+              <a:buNone/>
+            </a:pPr>
+            <a:r>
+              <a:rPr lang="en-GB" sz="3700" dirty="0"/>
+              <a:t>      </a:t>
+            </a:r>
+            <a:r>
+              <a:rPr lang="en-GB" sz="3700" dirty="0" err="1"/>
+              <a:t>val</a:t>
+            </a:r>
+            <a:r>
+              <a:rPr lang="en-GB" sz="3700" dirty="0"/>
+              <a:t> cache = </a:t>
+            </a:r>
+            <a:r>
+              <a:rPr lang="en-GB" sz="3700" dirty="0" err="1"/>
+              <a:t>collection.mutable.Map</a:t>
+            </a:r>
+            <a:r>
+              <a:rPr lang="en-GB" sz="3700" dirty="0"/>
+              <a:t>[String, String]()</a:t>
+            </a:r>
+          </a:p>
+          <a:p>
+            <a:pPr marL="0" indent="0">
+              <a:buNone/>
+            </a:pPr>
+            <a:r>
+              <a:rPr lang="en-GB" sz="3700" dirty="0"/>
+              <a:t>      </a:t>
+            </a:r>
+            <a:r>
+              <a:rPr lang="en-GB" sz="4900" dirty="0" err="1"/>
+              <a:t>val</a:t>
+            </a:r>
+            <a:r>
+              <a:rPr lang="en-GB" sz="4900" dirty="0"/>
+              <a:t> </a:t>
+            </a:r>
+            <a:r>
+              <a:rPr lang="en-GB" sz="4900" dirty="0" err="1"/>
+              <a:t>jse</a:t>
+            </a:r>
+            <a:r>
+              <a:rPr lang="en-GB" sz="4900" dirty="0"/>
+              <a:t> = </a:t>
+            </a:r>
+            <a:r>
+              <a:rPr lang="en-GB" sz="4900" dirty="0" err="1"/>
+              <a:t>webDriver.asInstanceOf</a:t>
+            </a:r>
+            <a:r>
+              <a:rPr lang="en-GB" sz="4900" dirty="0"/>
+              <a:t>[</a:t>
+            </a:r>
+            <a:r>
+              <a:rPr lang="en-GB" sz="4900" dirty="0" err="1">
+                <a:solidFill>
+                  <a:srgbClr val="00B0F0"/>
+                </a:solidFill>
+              </a:rPr>
+              <a:t>JavascriptExecutor</a:t>
+            </a:r>
+            <a:r>
+              <a:rPr lang="en-GB" sz="4900" dirty="0"/>
+              <a:t>]</a:t>
+            </a:r>
+          </a:p>
+          <a:p>
+            <a:pPr marL="0" indent="0">
+              <a:buNone/>
+            </a:pPr>
+            <a:r>
+              <a:rPr lang="en-GB" sz="3700" dirty="0"/>
+              <a:t>      </a:t>
+            </a:r>
+            <a:r>
+              <a:rPr lang="en-GB" sz="3700" dirty="0" err="1"/>
+              <a:t>def</a:t>
+            </a:r>
+            <a:r>
+              <a:rPr lang="en-GB" sz="3700" dirty="0"/>
+              <a:t> </a:t>
+            </a:r>
+            <a:r>
+              <a:rPr lang="en-GB" sz="3700" dirty="0" err="1"/>
+              <a:t>getUrlSource</a:t>
+            </a:r>
+            <a:r>
+              <a:rPr lang="en-GB" sz="3700" dirty="0"/>
+              <a:t>(</a:t>
+            </a:r>
+            <a:r>
+              <a:rPr lang="en-GB" sz="3700" dirty="0" err="1"/>
+              <a:t>arg</a:t>
+            </a:r>
+            <a:r>
+              <a:rPr lang="en-GB" sz="3700" dirty="0"/>
+              <a:t>: String): String = cache get </a:t>
+            </a:r>
+            <a:r>
+              <a:rPr lang="en-GB" sz="3700" dirty="0" err="1"/>
+              <a:t>arg</a:t>
+            </a:r>
+            <a:r>
+              <a:rPr lang="en-GB" sz="3700" dirty="0"/>
+              <a:t> match {</a:t>
+            </a:r>
+          </a:p>
+          <a:p>
+            <a:pPr marL="0" indent="0">
+              <a:buNone/>
+            </a:pPr>
+            <a:r>
+              <a:rPr lang="en-GB" sz="3700" dirty="0"/>
+              <a:t>        case Some(result) =&gt; result</a:t>
+            </a:r>
+          </a:p>
+          <a:p>
+            <a:pPr marL="0" indent="0">
+              <a:buNone/>
+            </a:pPr>
+            <a:r>
+              <a:rPr lang="en-GB" sz="3700" dirty="0"/>
+              <a:t>        case None =&gt;</a:t>
+            </a:r>
+          </a:p>
+          <a:p>
+            <a:pPr marL="0" indent="0">
+              <a:buNone/>
+            </a:pPr>
+            <a:r>
+              <a:rPr lang="en-GB" sz="3700" dirty="0"/>
+              <a:t>          </a:t>
+            </a:r>
+            <a:r>
+              <a:rPr lang="en-GB" sz="3700" dirty="0" err="1"/>
+              <a:t>val</a:t>
+            </a:r>
+            <a:r>
+              <a:rPr lang="en-GB" sz="3700" dirty="0"/>
+              <a:t> result: String = </a:t>
+            </a:r>
+            <a:r>
+              <a:rPr lang="en-GB" sz="3700" dirty="0" err="1"/>
+              <a:t>scala.io.Source.fromURL</a:t>
+            </a:r>
+            <a:r>
+              <a:rPr lang="en-GB" sz="3700" dirty="0"/>
+              <a:t>(</a:t>
+            </a:r>
+            <a:r>
+              <a:rPr lang="en-GB" sz="3700" dirty="0" err="1"/>
+              <a:t>arg</a:t>
+            </a:r>
+            <a:r>
+              <a:rPr lang="en-GB" sz="3700" dirty="0"/>
+              <a:t>).</a:t>
+            </a:r>
+            <a:r>
+              <a:rPr lang="en-GB" sz="3700" dirty="0" err="1"/>
+              <a:t>mkString</a:t>
+            </a:r>
+            <a:endParaRPr lang="en-GB" sz="3700" dirty="0"/>
+          </a:p>
+          <a:p>
+            <a:pPr marL="0" indent="0">
+              <a:buNone/>
+            </a:pPr>
+            <a:r>
+              <a:rPr lang="en-GB" sz="3700" dirty="0"/>
+              <a:t>          cache(</a:t>
+            </a:r>
+            <a:r>
+              <a:rPr lang="en-GB" sz="3700" dirty="0" err="1"/>
+              <a:t>arg</a:t>
+            </a:r>
+            <a:r>
+              <a:rPr lang="en-GB" sz="3700" dirty="0"/>
+              <a:t>) = result</a:t>
+            </a:r>
+          </a:p>
+          <a:p>
+            <a:pPr marL="0" indent="0">
+              <a:buNone/>
+            </a:pPr>
+            <a:r>
+              <a:rPr lang="en-GB" sz="3700" dirty="0"/>
+              <a:t>          result</a:t>
+            </a:r>
+          </a:p>
+          <a:p>
+            <a:pPr marL="0" indent="0">
+              <a:buNone/>
+            </a:pPr>
+            <a:r>
+              <a:rPr lang="en-GB" sz="3700" dirty="0"/>
+              <a:t>      }</a:t>
+            </a:r>
+          </a:p>
+          <a:p>
+            <a:pPr marL="0" indent="0">
+              <a:buNone/>
+            </a:pPr>
+            <a:r>
+              <a:rPr lang="en-GB" sz="3700" dirty="0"/>
+              <a:t>      </a:t>
+            </a:r>
+            <a:r>
+              <a:rPr lang="en-GB" sz="4900" dirty="0" err="1"/>
+              <a:t>jse.executeScript</a:t>
+            </a:r>
+            <a:r>
+              <a:rPr lang="en-GB" sz="4900" dirty="0"/>
+              <a:t>(</a:t>
+            </a:r>
+            <a:r>
+              <a:rPr lang="en-GB" sz="4900" dirty="0" err="1"/>
+              <a:t>getUrlSource</a:t>
+            </a:r>
+            <a:r>
+              <a:rPr lang="en-GB" sz="4900" dirty="0"/>
+              <a:t>("https://raw.githubusercontent.com/</a:t>
+            </a:r>
+            <a:r>
+              <a:rPr lang="en-GB" sz="4900" dirty="0" err="1"/>
+              <a:t>GoogleChrome</a:t>
+            </a:r>
+            <a:r>
+              <a:rPr lang="en-GB" sz="4900" dirty="0"/>
+              <a:t>/" +</a:t>
+            </a:r>
+          </a:p>
+          <a:p>
+            <a:pPr marL="0" indent="0">
+              <a:buNone/>
+            </a:pPr>
+            <a:r>
+              <a:rPr lang="en-GB" sz="4900" dirty="0"/>
+              <a:t>        "accessibility-developer-tools/stable/</a:t>
+            </a:r>
+            <a:r>
+              <a:rPr lang="en-GB" sz="4900" dirty="0" err="1"/>
+              <a:t>dist</a:t>
+            </a:r>
+            <a:r>
+              <a:rPr lang="en-GB" sz="4900" dirty="0"/>
+              <a:t>/</a:t>
+            </a:r>
+            <a:r>
+              <a:rPr lang="en-GB" sz="4900" dirty="0" err="1"/>
+              <a:t>js</a:t>
+            </a:r>
+            <a:r>
+              <a:rPr lang="en-GB" sz="4900" dirty="0"/>
+              <a:t>/</a:t>
+            </a:r>
+            <a:r>
+              <a:rPr lang="en-GB" sz="4900" dirty="0">
+                <a:solidFill>
+                  <a:srgbClr val="00B0F0"/>
+                </a:solidFill>
+              </a:rPr>
+              <a:t>axs_testing.js</a:t>
+            </a:r>
+            <a:r>
+              <a:rPr lang="en-GB" sz="4900" dirty="0"/>
+              <a:t>"))</a:t>
+            </a:r>
+          </a:p>
+          <a:p>
+            <a:pPr marL="0" indent="0">
+              <a:buNone/>
+            </a:pPr>
+            <a:r>
+              <a:rPr lang="en-GB" sz="3700" dirty="0"/>
+              <a:t>      </a:t>
+            </a:r>
+            <a:r>
+              <a:rPr lang="en-GB" sz="3700" dirty="0" err="1"/>
+              <a:t>val</a:t>
+            </a:r>
+            <a:r>
+              <a:rPr lang="en-GB" sz="3700" dirty="0"/>
+              <a:t> report = </a:t>
+            </a:r>
+            <a:r>
+              <a:rPr lang="en-GB" sz="3700" dirty="0" err="1"/>
+              <a:t>jse.executeScript</a:t>
+            </a:r>
+            <a:r>
+              <a:rPr lang="en-GB" sz="3700" dirty="0"/>
+              <a:t>("</a:t>
+            </a:r>
+            <a:r>
+              <a:rPr lang="en-GB" sz="3700" dirty="0" err="1"/>
+              <a:t>var</a:t>
+            </a:r>
+            <a:r>
+              <a:rPr lang="en-GB" sz="3700" dirty="0"/>
+              <a:t> results = </a:t>
+            </a:r>
+            <a:r>
+              <a:rPr lang="en-GB" sz="3700" dirty="0" err="1"/>
+              <a:t>axs.Audit.run</a:t>
+            </a:r>
+            <a:r>
+              <a:rPr lang="en-GB" sz="3700" dirty="0"/>
+              <a:t>();return </a:t>
+            </a:r>
+            <a:r>
+              <a:rPr lang="en-GB" sz="3700" dirty="0" err="1"/>
+              <a:t>axs.Audit.createReport</a:t>
+            </a:r>
+            <a:r>
+              <a:rPr lang="en-GB" sz="3700" dirty="0"/>
+              <a:t>(results);")</a:t>
+            </a:r>
+          </a:p>
+          <a:p>
+            <a:pPr marL="0" indent="0">
+              <a:buNone/>
+            </a:pPr>
+            <a:r>
+              <a:rPr lang="en-GB" sz="3700" dirty="0"/>
+              <a:t>      </a:t>
+            </a:r>
+            <a:r>
+              <a:rPr lang="en-GB" sz="3700" dirty="0" err="1"/>
+              <a:t>println</a:t>
+            </a:r>
+            <a:r>
+              <a:rPr lang="en-GB" sz="3700" dirty="0"/>
+              <a:t>(report)</a:t>
+            </a:r>
+          </a:p>
+          <a:p>
+            <a:pPr marL="0" indent="0">
+              <a:buNone/>
+            </a:pPr>
+            <a:r>
+              <a:rPr lang="en-GB" sz="3700" dirty="0"/>
+              <a:t>    }</a:t>
+            </a:r>
+          </a:p>
+          <a:p>
+            <a:pPr marL="0" indent="0">
+              <a:buNone/>
+            </a:pPr>
+            <a:r>
+              <a:rPr lang="en-GB" sz="3700" dirty="0"/>
+              <a:t>  }</a:t>
+            </a:r>
+          </a:p>
+          <a:p>
+            <a:pPr marL="0" indent="0">
+              <a:buNone/>
+            </a:pPr>
+            <a:endParaRPr lang="en-GB" sz="3200" dirty="0"/>
+          </a:p>
+        </p:txBody>
+      </p:sp>
+      <p:sp>
+        <p:nvSpPr>
+          <p:cNvPr id="7" name="Title"/>
+          <p:cNvSpPr>
+            <a:spLocks noGrp="1"/>
+          </p:cNvSpPr>
+          <p:nvPr>
+            <p:ph type="title"/>
+          </p:nvPr>
+        </p:nvSpPr>
+        <p:spPr>
+          <a:xfrm>
+            <a:off x="457200" y="381000"/>
+            <a:ext cx="8001000" cy="609600"/>
+          </a:xfrm>
+        </p:spPr>
+        <p:txBody>
+          <a:bodyPr>
+            <a:noAutofit/>
+          </a:bodyPr>
+          <a:lstStyle/>
+          <a:p>
+            <a:r>
+              <a:rPr lang="en-GB" sz="4000" dirty="0"/>
+              <a:t>Code for test execution</a:t>
+            </a:r>
+          </a:p>
+        </p:txBody>
+      </p:sp>
+    </p:spTree>
+    <p:extLst>
+      <p:ext uri="{BB962C8B-B14F-4D97-AF65-F5344CB8AC3E}">
+        <p14:creationId xmlns:p14="http://schemas.microsoft.com/office/powerpoint/2010/main" val="2442912753"/>
+      </p:ext>
+    </p:extLst>
+  </p:cSld>
+  <p:clrMapOvr>
+    <a:masterClrMapping/>
+  </p:clrMapOvr>
+</p:sld>
+</file>
+
+<file path=ppt/slides/slide16.xml><?xml version="1.0" encoding="utf-8"?>
+<p:sld xmlns:a="http://schemas.openxmlformats.org/drawingml/2006/main" xmlns:r="http://schemas.openxmlformats.org/officeDocument/2006/relationships" xmlns:p="http://schemas.openxmlformats.org/presentationml/2006/main">
+  <p:cSld>
+    <p:spTree>
+      <p:nvGrpSpPr>
+        <p:cNvPr id="1" name=""/>
+        <p:cNvGrpSpPr/>
+        <p:nvPr/>
+      </p:nvGrpSpPr>
+      <p:grpSpPr>
+        <a:xfrm>
+          <a:off x="0" y="0"/>
+          <a:ext cx="0" cy="0"/>
+          <a:chOff x="0" y="0"/>
+          <a:chExt cx="0" cy="0"/>
+        </a:xfrm>
+      </p:grpSpPr>
+      <p:sp>
+        <p:nvSpPr>
+          <p:cNvPr id="9" name="Subtitle"/>
+          <p:cNvSpPr txBox="1">
+            <a:spLocks/>
+          </p:cNvSpPr>
+          <p:nvPr/>
+        </p:nvSpPr>
+        <p:spPr>
+          <a:xfrm>
+            <a:off x="533400" y="1066800"/>
+            <a:ext cx="7848600" cy="4724400"/>
+          </a:xfrm>
+          <a:prstGeom prst="rect">
+            <a:avLst/>
+          </a:prstGeom>
+        </p:spPr>
+        <p:txBody>
+          <a:bodyPr vert="horz" lIns="91440" tIns="45720" rIns="91440" bIns="45720" rtlCol="0" anchor="ctr">
+            <a:normAutofit/>
+          </a:bodyPr>
+          <a:lstStyle>
+            <a:lvl1pPr marL="182880" indent="-182880" algn="l" defTabSz="914400" rtl="0" eaLnBrk="1" latinLnBrk="0" hangingPunct="1">
+              <a:spcBef>
+                <a:spcPct val="20000"/>
+              </a:spcBef>
+              <a:buClr>
+                <a:schemeClr val="tx1">
+                  <a:lumMod val="50000"/>
+                  <a:lumOff val="50000"/>
+                </a:schemeClr>
+              </a:buClr>
+              <a:buFont typeface="Wingdings" pitchFamily="2" charset="2"/>
+              <a:buChar char="§"/>
+              <a:defRPr sz="1800" kern="1200">
+                <a:solidFill>
+                  <a:schemeClr val="tx1">
+                    <a:lumMod val="85000"/>
+                  </a:schemeClr>
+                </a:solidFill>
+                <a:latin typeface="+mn-lt"/>
+                <a:ea typeface="+mn-ea"/>
+                <a:cs typeface="+mn-cs"/>
+              </a:defRPr>
+            </a:lvl1pPr>
+            <a:lvl2pPr marL="411480" indent="-182880" algn="l" defTabSz="914400" rtl="0" eaLnBrk="1" latinLnBrk="0" hangingPunct="1">
+              <a:spcBef>
+                <a:spcPct val="20000"/>
+              </a:spcBef>
+              <a:buClr>
+                <a:schemeClr val="tx1">
+                  <a:lumMod val="50000"/>
+                  <a:lumOff val="50000"/>
+                </a:schemeClr>
+              </a:buClr>
+              <a:buFont typeface="Wingdings" pitchFamily="2" charset="2"/>
+              <a:buChar char="§"/>
+              <a:defRPr sz="1400" kern="1200">
+                <a:solidFill>
+                  <a:schemeClr val="tx1">
+                    <a:lumMod val="85000"/>
+                  </a:schemeClr>
+                </a:solidFill>
+                <a:latin typeface="+mn-lt"/>
+                <a:ea typeface="+mn-ea"/>
+                <a:cs typeface="+mn-cs"/>
+              </a:defRPr>
+            </a:lvl2pPr>
+            <a:lvl3pPr marL="594360" indent="-182880" algn="l" defTabSz="914400" rtl="0" eaLnBrk="1" latinLnBrk="0" hangingPunct="1">
+              <a:spcBef>
+                <a:spcPct val="20000"/>
+              </a:spcBef>
+              <a:buClr>
+                <a:schemeClr val="tx1">
+                  <a:lumMod val="50000"/>
+                  <a:lumOff val="50000"/>
+                </a:schemeClr>
+              </a:buClr>
+              <a:buFont typeface="Wingdings" pitchFamily="2" charset="2"/>
+              <a:buChar char="§"/>
+              <a:defRPr sz="1400" kern="1200">
+                <a:solidFill>
+                  <a:schemeClr val="tx1">
+                    <a:lumMod val="85000"/>
+                  </a:schemeClr>
+                </a:solidFill>
+                <a:latin typeface="+mn-lt"/>
+                <a:ea typeface="+mn-ea"/>
+                <a:cs typeface="+mn-cs"/>
+              </a:defRPr>
+            </a:lvl3pPr>
+            <a:lvl4pPr marL="777240" indent="-182880" algn="l" defTabSz="914400" rtl="0" eaLnBrk="1" latinLnBrk="0" hangingPunct="1">
+              <a:spcBef>
+                <a:spcPct val="20000"/>
+              </a:spcBef>
+              <a:buClr>
+                <a:schemeClr val="tx1">
+                  <a:lumMod val="50000"/>
+                  <a:lumOff val="50000"/>
+                </a:schemeClr>
+              </a:buClr>
+              <a:buFont typeface="Wingdings" pitchFamily="2" charset="2"/>
+              <a:buChar char="§"/>
+              <a:defRPr sz="1400" kern="1200">
+                <a:solidFill>
+                  <a:schemeClr val="tx1">
+                    <a:lumMod val="85000"/>
+                  </a:schemeClr>
+                </a:solidFill>
+                <a:latin typeface="+mn-lt"/>
+                <a:ea typeface="+mn-ea"/>
+                <a:cs typeface="+mn-cs"/>
+              </a:defRPr>
+            </a:lvl4pPr>
+            <a:lvl5pPr marL="960120" indent="-182880" algn="l" defTabSz="914400" rtl="0" eaLnBrk="1" latinLnBrk="0" hangingPunct="1">
+              <a:spcBef>
+                <a:spcPct val="20000"/>
+              </a:spcBef>
+              <a:buClr>
+                <a:schemeClr val="tx1">
+                  <a:lumMod val="50000"/>
+                  <a:lumOff val="50000"/>
+                </a:schemeClr>
+              </a:buClr>
+              <a:buFont typeface="Wingdings" pitchFamily="2" charset="2"/>
+              <a:buChar char="§"/>
+              <a:defRPr sz="1400" kern="1200">
+                <a:solidFill>
+                  <a:schemeClr val="tx1">
+                    <a:lumMod val="85000"/>
+                  </a:schemeClr>
+                </a:solidFill>
+                <a:latin typeface="+mn-lt"/>
+                <a:ea typeface="+mn-ea"/>
+                <a:cs typeface="+mn-cs"/>
+              </a:defRPr>
+            </a:lvl5pPr>
+            <a:lvl6pPr marL="1143000" indent="-182880" algn="l" defTabSz="914400" rtl="0" eaLnBrk="1" latinLnBrk="0" hangingPunct="1">
+              <a:spcBef>
+                <a:spcPts val="288"/>
+              </a:spcBef>
+              <a:buClr>
+                <a:schemeClr val="tx1">
+                  <a:lumMod val="50000"/>
+                  <a:lumOff val="50000"/>
+                </a:schemeClr>
+              </a:buClr>
+              <a:buFont typeface="Wingdings" pitchFamily="2" charset="2"/>
+              <a:buChar char="§"/>
+              <a:defRPr sz="1400" kern="1200" baseline="0">
+                <a:solidFill>
+                  <a:schemeClr val="tx1"/>
+                </a:solidFill>
+                <a:latin typeface="+mn-lt"/>
+                <a:ea typeface="+mn-ea"/>
+                <a:cs typeface="+mn-cs"/>
+              </a:defRPr>
+            </a:lvl6pPr>
+            <a:lvl7pPr marL="1325880" indent="-182880" algn="l" defTabSz="914400" rtl="0" eaLnBrk="1" latinLnBrk="0" hangingPunct="1">
+              <a:spcBef>
+                <a:spcPts val="288"/>
+              </a:spcBef>
+              <a:buClr>
+                <a:schemeClr val="tx1">
+                  <a:lumMod val="50000"/>
+                  <a:lumOff val="50000"/>
+                </a:schemeClr>
+              </a:buClr>
+              <a:buFont typeface="Wingdings" pitchFamily="2" charset="2"/>
+              <a:buChar char="§"/>
+              <a:defRPr sz="1400" kern="1200" baseline="0">
+                <a:solidFill>
+                  <a:schemeClr val="tx1"/>
+                </a:solidFill>
+                <a:latin typeface="+mn-lt"/>
+                <a:ea typeface="+mn-ea"/>
+                <a:cs typeface="+mn-cs"/>
+              </a:defRPr>
+            </a:lvl7pPr>
+            <a:lvl8pPr marL="1508760" indent="-182880" algn="l" defTabSz="914400" rtl="0" eaLnBrk="1" latinLnBrk="0" hangingPunct="1">
+              <a:spcBef>
+                <a:spcPts val="288"/>
+              </a:spcBef>
+              <a:buClr>
+                <a:schemeClr val="tx1">
+                  <a:lumMod val="50000"/>
+                  <a:lumOff val="50000"/>
+                </a:schemeClr>
+              </a:buClr>
+              <a:buFont typeface="Wingdings" pitchFamily="2" charset="2"/>
+              <a:buChar char="§"/>
+              <a:defRPr sz="1400" kern="1200" baseline="0">
+                <a:solidFill>
+                  <a:schemeClr val="tx1"/>
+                </a:solidFill>
+                <a:latin typeface="+mn-lt"/>
+                <a:ea typeface="+mn-ea"/>
+                <a:cs typeface="+mn-cs"/>
+              </a:defRPr>
+            </a:lvl8pPr>
+            <a:lvl9pPr marL="1691640" indent="-182880" algn="l" defTabSz="914400" rtl="0" eaLnBrk="1" latinLnBrk="0" hangingPunct="1">
+              <a:spcBef>
+                <a:spcPts val="288"/>
+              </a:spcBef>
+              <a:buClr>
+                <a:schemeClr val="tx1">
+                  <a:lumMod val="50000"/>
+                  <a:lumOff val="50000"/>
+                </a:schemeClr>
+              </a:buClr>
+              <a:buFont typeface="Wingdings" pitchFamily="2" charset="2"/>
+              <a:buChar char="§"/>
+              <a:defRPr sz="1400" kern="1200" baseline="0">
+                <a:solidFill>
+                  <a:schemeClr val="tx1"/>
+                </a:solidFill>
+                <a:latin typeface="+mn-lt"/>
+                <a:ea typeface="+mn-ea"/>
+                <a:cs typeface="+mn-cs"/>
+              </a:defRPr>
+            </a:lvl9pPr>
+          </a:lstStyle>
+          <a:p>
+            <a:pPr marL="0" indent="0">
+              <a:buNone/>
+            </a:pPr>
+            <a:r>
+              <a:rPr lang="en-GB" sz="3200" dirty="0" smtClean="0"/>
+              <a:t>The report is generated with the help of a JavaScript code which is held within axs_testing.js (snippet visible in the previous slide as well):</a:t>
+            </a:r>
+            <a:br>
+              <a:rPr lang="en-GB" sz="3200" dirty="0" smtClean="0"/>
+            </a:br>
+            <a:r>
+              <a:rPr lang="en-GB" sz="3200" dirty="0" smtClean="0"/>
+              <a:t/>
+            </a:r>
+            <a:br>
+              <a:rPr lang="en-GB" sz="3200" dirty="0" smtClean="0"/>
+            </a:br>
+            <a:r>
+              <a:rPr lang="en-GB" sz="2000" dirty="0" err="1">
+                <a:solidFill>
+                  <a:schemeClr val="tx1"/>
+                </a:solidFill>
+              </a:rPr>
+              <a:t>val</a:t>
+            </a:r>
+            <a:r>
+              <a:rPr lang="en-GB" sz="2000" dirty="0">
+                <a:solidFill>
+                  <a:schemeClr val="tx1"/>
+                </a:solidFill>
+              </a:rPr>
+              <a:t> report = </a:t>
+            </a:r>
+            <a:r>
+              <a:rPr lang="en-GB" sz="2000" dirty="0" err="1">
+                <a:solidFill>
+                  <a:schemeClr val="tx1"/>
+                </a:solidFill>
+              </a:rPr>
+              <a:t>jse.executeScript</a:t>
+            </a:r>
+            <a:r>
+              <a:rPr lang="en-GB" sz="2000" dirty="0"/>
+              <a:t>("</a:t>
+            </a:r>
+            <a:r>
+              <a:rPr lang="en-GB" sz="2000" dirty="0" err="1"/>
+              <a:t>var</a:t>
+            </a:r>
+            <a:r>
+              <a:rPr lang="en-GB" sz="2000" dirty="0"/>
+              <a:t> </a:t>
+            </a:r>
+            <a:r>
+              <a:rPr lang="en-GB" sz="2000" dirty="0">
+                <a:solidFill>
+                  <a:schemeClr val="tx1"/>
+                </a:solidFill>
+              </a:rPr>
+              <a:t>results </a:t>
+            </a:r>
+            <a:r>
+              <a:rPr lang="en-GB" sz="2000" dirty="0"/>
+              <a:t>= </a:t>
+            </a:r>
+            <a:r>
+              <a:rPr lang="en-GB" sz="2000" dirty="0" err="1"/>
+              <a:t>axs.Audit.run</a:t>
+            </a:r>
+            <a:r>
+              <a:rPr lang="en-GB" sz="2000" dirty="0"/>
+              <a:t>();return </a:t>
+            </a:r>
+            <a:r>
+              <a:rPr lang="en-GB" sz="2000" dirty="0" err="1"/>
+              <a:t>axs.Audit.</a:t>
+            </a:r>
+            <a:r>
+              <a:rPr lang="en-GB" sz="2000" dirty="0" err="1">
+                <a:solidFill>
+                  <a:srgbClr val="00B0F0"/>
+                </a:solidFill>
+              </a:rPr>
+              <a:t>createReport</a:t>
+            </a:r>
+            <a:r>
+              <a:rPr lang="en-GB" sz="2000" dirty="0"/>
+              <a:t>(results);")</a:t>
+            </a:r>
+          </a:p>
+          <a:p>
+            <a:pPr marL="0" indent="0">
+              <a:buNone/>
+            </a:pPr>
+            <a:r>
+              <a:rPr lang="en-GB" sz="2000" dirty="0"/>
+              <a:t>      </a:t>
+            </a:r>
+            <a:r>
+              <a:rPr lang="en-GB" sz="2000" dirty="0" err="1">
+                <a:solidFill>
+                  <a:schemeClr val="tx1"/>
+                </a:solidFill>
+              </a:rPr>
+              <a:t>println</a:t>
+            </a:r>
+            <a:r>
+              <a:rPr lang="en-GB" sz="2000" dirty="0">
+                <a:solidFill>
+                  <a:schemeClr val="tx1"/>
+                </a:solidFill>
+              </a:rPr>
+              <a:t>(report</a:t>
+            </a:r>
+            <a:r>
+              <a:rPr lang="en-GB" sz="2000" dirty="0" smtClean="0">
+                <a:solidFill>
+                  <a:schemeClr val="tx1"/>
+                </a:solidFill>
+              </a:rPr>
+              <a:t>)</a:t>
+            </a:r>
+          </a:p>
+          <a:p>
+            <a:pPr marL="0" indent="0">
+              <a:buNone/>
+            </a:pPr>
+            <a:endParaRPr lang="en-GB" sz="3200" dirty="0"/>
+          </a:p>
+          <a:p>
+            <a:pPr marL="0" indent="0">
+              <a:buNone/>
+            </a:pPr>
+            <a:endParaRPr lang="en-GB" sz="3200" dirty="0"/>
+          </a:p>
+        </p:txBody>
+      </p:sp>
+      <p:sp>
+        <p:nvSpPr>
+          <p:cNvPr id="7" name="Title"/>
+          <p:cNvSpPr>
+            <a:spLocks noGrp="1"/>
+          </p:cNvSpPr>
+          <p:nvPr>
+            <p:ph type="title"/>
+          </p:nvPr>
+        </p:nvSpPr>
+        <p:spPr>
+          <a:xfrm>
+            <a:off x="457200" y="381000"/>
+            <a:ext cx="8001000" cy="609600"/>
+          </a:xfrm>
+        </p:spPr>
+        <p:txBody>
+          <a:bodyPr>
+            <a:noAutofit/>
+          </a:bodyPr>
+          <a:lstStyle/>
+          <a:p>
+            <a:r>
+              <a:rPr lang="en-GB" sz="4000" dirty="0"/>
+              <a:t>Code for </a:t>
+            </a:r>
+            <a:r>
+              <a:rPr lang="en-GB" sz="4000" dirty="0" smtClean="0"/>
+              <a:t>logs</a:t>
+            </a:r>
+            <a:endParaRPr lang="en-GB" sz="4000" dirty="0"/>
+          </a:p>
+        </p:txBody>
+      </p:sp>
+    </p:spTree>
+    <p:extLst>
+      <p:ext uri="{BB962C8B-B14F-4D97-AF65-F5344CB8AC3E}">
+        <p14:creationId xmlns:p14="http://schemas.microsoft.com/office/powerpoint/2010/main" val="1388096090"/>
+      </p:ext>
+    </p:extLst>
+  </p:cSld>
+  <p:clrMapOvr>
+    <a:masterClrMapping/>
+  </p:clrMapOvr>
+</p:sld>
+</file>
+
+<file path=ppt/slides/slide17.xml><?xml version="1.0" encoding="utf-8"?>
+<p:sld xmlns:a="http://schemas.openxmlformats.org/drawingml/2006/main" xmlns:r="http://schemas.openxmlformats.org/officeDocument/2006/relationships" xmlns:p="http://schemas.openxmlformats.org/presentationml/2006/main">
+  <p:cSld>
+    <p:spTree>
+      <p:nvGrpSpPr>
+        <p:cNvPr id="1" name=""/>
+        <p:cNvGrpSpPr/>
+        <p:nvPr/>
+      </p:nvGrpSpPr>
+      <p:grpSpPr>
+        <a:xfrm>
+          <a:off x="0" y="0"/>
+          <a:ext cx="0" cy="0"/>
+          <a:chOff x="0" y="0"/>
+          <a:chExt cx="0" cy="0"/>
+        </a:xfrm>
+      </p:grpSpPr>
+      <p:sp>
+        <p:nvSpPr>
+          <p:cNvPr id="9" name="Subtitle"/>
+          <p:cNvSpPr txBox="1">
+            <a:spLocks/>
+          </p:cNvSpPr>
+          <p:nvPr/>
+        </p:nvSpPr>
+        <p:spPr>
+          <a:xfrm>
+            <a:off x="533400" y="1066800"/>
+            <a:ext cx="7848600" cy="4724400"/>
+          </a:xfrm>
+          <a:prstGeom prst="rect">
+            <a:avLst/>
+          </a:prstGeom>
+        </p:spPr>
+        <p:txBody>
+          <a:bodyPr vert="horz" lIns="91440" tIns="45720" rIns="91440" bIns="45720" rtlCol="0" anchor="ctr">
+            <a:normAutofit/>
+          </a:bodyPr>
+          <a:lstStyle>
+            <a:lvl1pPr marL="182880" indent="-182880" algn="l" defTabSz="914400" rtl="0" eaLnBrk="1" latinLnBrk="0" hangingPunct="1">
+              <a:spcBef>
+                <a:spcPct val="20000"/>
+              </a:spcBef>
+              <a:buClr>
+                <a:schemeClr val="tx1">
+                  <a:lumMod val="50000"/>
+                  <a:lumOff val="50000"/>
+                </a:schemeClr>
+              </a:buClr>
+              <a:buFont typeface="Wingdings" pitchFamily="2" charset="2"/>
+              <a:buChar char="§"/>
+              <a:defRPr sz="1800" kern="1200">
+                <a:solidFill>
+                  <a:schemeClr val="tx1">
+                    <a:lumMod val="85000"/>
+                  </a:schemeClr>
+                </a:solidFill>
+                <a:latin typeface="+mn-lt"/>
+                <a:ea typeface="+mn-ea"/>
+                <a:cs typeface="+mn-cs"/>
+              </a:defRPr>
+            </a:lvl1pPr>
+            <a:lvl2pPr marL="411480" indent="-182880" algn="l" defTabSz="914400" rtl="0" eaLnBrk="1" latinLnBrk="0" hangingPunct="1">
+              <a:spcBef>
+                <a:spcPct val="20000"/>
+              </a:spcBef>
+              <a:buClr>
+                <a:schemeClr val="tx1">
+                  <a:lumMod val="50000"/>
+                  <a:lumOff val="50000"/>
+                </a:schemeClr>
+              </a:buClr>
+              <a:buFont typeface="Wingdings" pitchFamily="2" charset="2"/>
+              <a:buChar char="§"/>
+              <a:defRPr sz="1400" kern="1200">
+                <a:solidFill>
+                  <a:schemeClr val="tx1">
+                    <a:lumMod val="85000"/>
+                  </a:schemeClr>
+                </a:solidFill>
+                <a:latin typeface="+mn-lt"/>
+                <a:ea typeface="+mn-ea"/>
+                <a:cs typeface="+mn-cs"/>
+              </a:defRPr>
+            </a:lvl2pPr>
+            <a:lvl3pPr marL="594360" indent="-182880" algn="l" defTabSz="914400" rtl="0" eaLnBrk="1" latinLnBrk="0" hangingPunct="1">
+              <a:spcBef>
+                <a:spcPct val="20000"/>
+              </a:spcBef>
+              <a:buClr>
+                <a:schemeClr val="tx1">
+                  <a:lumMod val="50000"/>
+                  <a:lumOff val="50000"/>
+                </a:schemeClr>
+              </a:buClr>
+              <a:buFont typeface="Wingdings" pitchFamily="2" charset="2"/>
+              <a:buChar char="§"/>
+              <a:defRPr sz="1400" kern="1200">
+                <a:solidFill>
+                  <a:schemeClr val="tx1">
+                    <a:lumMod val="85000"/>
+                  </a:schemeClr>
+                </a:solidFill>
+                <a:latin typeface="+mn-lt"/>
+                <a:ea typeface="+mn-ea"/>
+                <a:cs typeface="+mn-cs"/>
+              </a:defRPr>
+            </a:lvl3pPr>
+            <a:lvl4pPr marL="777240" indent="-182880" algn="l" defTabSz="914400" rtl="0" eaLnBrk="1" latinLnBrk="0" hangingPunct="1">
+              <a:spcBef>
+                <a:spcPct val="20000"/>
+              </a:spcBef>
+              <a:buClr>
+                <a:schemeClr val="tx1">
+                  <a:lumMod val="50000"/>
+                  <a:lumOff val="50000"/>
+                </a:schemeClr>
+              </a:buClr>
+              <a:buFont typeface="Wingdings" pitchFamily="2" charset="2"/>
+              <a:buChar char="§"/>
+              <a:defRPr sz="1400" kern="1200">
+                <a:solidFill>
+                  <a:schemeClr val="tx1">
+                    <a:lumMod val="85000"/>
+                  </a:schemeClr>
+                </a:solidFill>
+                <a:latin typeface="+mn-lt"/>
+                <a:ea typeface="+mn-ea"/>
+                <a:cs typeface="+mn-cs"/>
+              </a:defRPr>
+            </a:lvl4pPr>
+            <a:lvl5pPr marL="960120" indent="-182880" algn="l" defTabSz="914400" rtl="0" eaLnBrk="1" latinLnBrk="0" hangingPunct="1">
+              <a:spcBef>
+                <a:spcPct val="20000"/>
+              </a:spcBef>
+              <a:buClr>
+                <a:schemeClr val="tx1">
+                  <a:lumMod val="50000"/>
+                  <a:lumOff val="50000"/>
+                </a:schemeClr>
+              </a:buClr>
+              <a:buFont typeface="Wingdings" pitchFamily="2" charset="2"/>
+              <a:buChar char="§"/>
+              <a:defRPr sz="1400" kern="1200">
+                <a:solidFill>
+                  <a:schemeClr val="tx1">
+                    <a:lumMod val="85000"/>
+                  </a:schemeClr>
+                </a:solidFill>
+                <a:latin typeface="+mn-lt"/>
+                <a:ea typeface="+mn-ea"/>
+                <a:cs typeface="+mn-cs"/>
+              </a:defRPr>
+            </a:lvl5pPr>
+            <a:lvl6pPr marL="1143000" indent="-182880" algn="l" defTabSz="914400" rtl="0" eaLnBrk="1" latinLnBrk="0" hangingPunct="1">
+              <a:spcBef>
+                <a:spcPts val="288"/>
+              </a:spcBef>
+              <a:buClr>
+                <a:schemeClr val="tx1">
+                  <a:lumMod val="50000"/>
+                  <a:lumOff val="50000"/>
+                </a:schemeClr>
+              </a:buClr>
+              <a:buFont typeface="Wingdings" pitchFamily="2" charset="2"/>
+              <a:buChar char="§"/>
+              <a:defRPr sz="1400" kern="1200" baseline="0">
+                <a:solidFill>
+                  <a:schemeClr val="tx1"/>
+                </a:solidFill>
+                <a:latin typeface="+mn-lt"/>
+                <a:ea typeface="+mn-ea"/>
+                <a:cs typeface="+mn-cs"/>
+              </a:defRPr>
+            </a:lvl6pPr>
+            <a:lvl7pPr marL="1325880" indent="-182880" algn="l" defTabSz="914400" rtl="0" eaLnBrk="1" latinLnBrk="0" hangingPunct="1">
+              <a:spcBef>
+                <a:spcPts val="288"/>
+              </a:spcBef>
+              <a:buClr>
+                <a:schemeClr val="tx1">
+                  <a:lumMod val="50000"/>
+                  <a:lumOff val="50000"/>
+                </a:schemeClr>
+              </a:buClr>
+              <a:buFont typeface="Wingdings" pitchFamily="2" charset="2"/>
+              <a:buChar char="§"/>
+              <a:defRPr sz="1400" kern="1200" baseline="0">
+                <a:solidFill>
+                  <a:schemeClr val="tx1"/>
+                </a:solidFill>
+                <a:latin typeface="+mn-lt"/>
+                <a:ea typeface="+mn-ea"/>
+                <a:cs typeface="+mn-cs"/>
+              </a:defRPr>
+            </a:lvl7pPr>
+            <a:lvl8pPr marL="1508760" indent="-182880" algn="l" defTabSz="914400" rtl="0" eaLnBrk="1" latinLnBrk="0" hangingPunct="1">
+              <a:spcBef>
+                <a:spcPts val="288"/>
+              </a:spcBef>
+              <a:buClr>
+                <a:schemeClr val="tx1">
+                  <a:lumMod val="50000"/>
+                  <a:lumOff val="50000"/>
+                </a:schemeClr>
+              </a:buClr>
+              <a:buFont typeface="Wingdings" pitchFamily="2" charset="2"/>
+              <a:buChar char="§"/>
+              <a:defRPr sz="1400" kern="1200" baseline="0">
+                <a:solidFill>
+                  <a:schemeClr val="tx1"/>
+                </a:solidFill>
+                <a:latin typeface="+mn-lt"/>
+                <a:ea typeface="+mn-ea"/>
+                <a:cs typeface="+mn-cs"/>
+              </a:defRPr>
+            </a:lvl8pPr>
+            <a:lvl9pPr marL="1691640" indent="-182880" algn="l" defTabSz="914400" rtl="0" eaLnBrk="1" latinLnBrk="0" hangingPunct="1">
+              <a:spcBef>
+                <a:spcPts val="288"/>
+              </a:spcBef>
+              <a:buClr>
+                <a:schemeClr val="tx1">
+                  <a:lumMod val="50000"/>
+                  <a:lumOff val="50000"/>
+                </a:schemeClr>
+              </a:buClr>
+              <a:buFont typeface="Wingdings" pitchFamily="2" charset="2"/>
+              <a:buChar char="§"/>
+              <a:defRPr sz="1400" kern="1200" baseline="0">
+                <a:solidFill>
+                  <a:schemeClr val="tx1"/>
+                </a:solidFill>
+                <a:latin typeface="+mn-lt"/>
+                <a:ea typeface="+mn-ea"/>
+                <a:cs typeface="+mn-cs"/>
+              </a:defRPr>
+            </a:lvl9pPr>
+          </a:lstStyle>
+          <a:p>
+            <a:pPr marL="0" indent="0">
+              <a:buNone/>
+            </a:pPr>
+            <a:r>
+              <a:rPr lang="en-GB" sz="3200" dirty="0" smtClean="0"/>
+              <a:t>Demo</a:t>
+            </a:r>
+            <a:endParaRPr lang="en-GB" sz="3200" dirty="0"/>
+          </a:p>
+        </p:txBody>
+      </p:sp>
+      <p:sp>
+        <p:nvSpPr>
+          <p:cNvPr id="7" name="Title"/>
+          <p:cNvSpPr>
+            <a:spLocks noGrp="1"/>
+          </p:cNvSpPr>
+          <p:nvPr>
+            <p:ph type="title"/>
+          </p:nvPr>
+        </p:nvSpPr>
+        <p:spPr>
+          <a:xfrm>
+            <a:off x="457200" y="381000"/>
+            <a:ext cx="8001000" cy="609600"/>
+          </a:xfrm>
+        </p:spPr>
+        <p:txBody>
+          <a:bodyPr>
+            <a:noAutofit/>
+          </a:bodyPr>
+          <a:lstStyle/>
+          <a:p>
+            <a:r>
+              <a:rPr lang="en-GB" sz="4000" dirty="0" smtClean="0"/>
+              <a:t>Demo</a:t>
+            </a:r>
+            <a:endParaRPr lang="en-GB" sz="4000" dirty="0"/>
+          </a:p>
+        </p:txBody>
+      </p:sp>
+    </p:spTree>
+    <p:extLst>
+      <p:ext uri="{BB962C8B-B14F-4D97-AF65-F5344CB8AC3E}">
+        <p14:creationId xmlns:p14="http://schemas.microsoft.com/office/powerpoint/2010/main" val="1992886324"/>
+      </p:ext>
+    </p:extLst>
+  </p:cSld>
+  <p:clrMapOvr>
+    <a:masterClrMapping/>
+  </p:clrMapOvr>
+</p:sld>
+</file>
+
+<file path=ppt/slides/slide18.xml><?xml version="1.0" encoding="utf-8"?>
+<p:sld xmlns:a="http://schemas.openxmlformats.org/drawingml/2006/main" xmlns:r="http://schemas.openxmlformats.org/officeDocument/2006/relationships" xmlns:p="http://schemas.openxmlformats.org/presentationml/2006/main">
+  <p:cSld>
+    <p:spTree>
+      <p:nvGrpSpPr>
+        <p:cNvPr id="1" name=""/>
+        <p:cNvGrpSpPr/>
+        <p:nvPr/>
+      </p:nvGrpSpPr>
+      <p:grpSpPr>
+        <a:xfrm>
+          <a:off x="0" y="0"/>
+          <a:ext cx="0" cy="0"/>
+          <a:chOff x="0" y="0"/>
+          <a:chExt cx="0" cy="0"/>
+        </a:xfrm>
+      </p:grpSpPr>
+      <p:sp>
+        <p:nvSpPr>
+          <p:cNvPr id="9" name="Subtitle"/>
+          <p:cNvSpPr txBox="1">
+            <a:spLocks/>
+          </p:cNvSpPr>
+          <p:nvPr/>
+        </p:nvSpPr>
+        <p:spPr>
+          <a:xfrm>
+            <a:off x="533400" y="1219200"/>
+            <a:ext cx="7848600" cy="5410200"/>
+          </a:xfrm>
+          <a:prstGeom prst="rect">
+            <a:avLst/>
+          </a:prstGeom>
+        </p:spPr>
+        <p:txBody>
+          <a:bodyPr vert="horz" lIns="91440" tIns="45720" rIns="91440" bIns="45720" rtlCol="0" anchor="ctr">
+            <a:normAutofit/>
+          </a:bodyPr>
+          <a:lstStyle>
+            <a:lvl1pPr marL="182880" indent="-182880" algn="l" defTabSz="914400" rtl="0" eaLnBrk="1" latinLnBrk="0" hangingPunct="1">
+              <a:spcBef>
+                <a:spcPct val="20000"/>
+              </a:spcBef>
+              <a:buClr>
+                <a:schemeClr val="tx1">
+                  <a:lumMod val="50000"/>
+                  <a:lumOff val="50000"/>
+                </a:schemeClr>
+              </a:buClr>
+              <a:buFont typeface="Wingdings" pitchFamily="2" charset="2"/>
+              <a:buChar char="§"/>
+              <a:defRPr sz="1800" kern="1200">
+                <a:solidFill>
+                  <a:schemeClr val="tx1">
+                    <a:lumMod val="85000"/>
+                  </a:schemeClr>
+                </a:solidFill>
+                <a:latin typeface="+mn-lt"/>
+                <a:ea typeface="+mn-ea"/>
+                <a:cs typeface="+mn-cs"/>
+              </a:defRPr>
+            </a:lvl1pPr>
+            <a:lvl2pPr marL="411480" indent="-182880" algn="l" defTabSz="914400" rtl="0" eaLnBrk="1" latinLnBrk="0" hangingPunct="1">
+              <a:spcBef>
+                <a:spcPct val="20000"/>
+              </a:spcBef>
+              <a:buClr>
+                <a:schemeClr val="tx1">
+                  <a:lumMod val="50000"/>
+                  <a:lumOff val="50000"/>
+                </a:schemeClr>
+              </a:buClr>
+              <a:buFont typeface="Wingdings" pitchFamily="2" charset="2"/>
+              <a:buChar char="§"/>
+              <a:defRPr sz="1400" kern="1200">
+                <a:solidFill>
+                  <a:schemeClr val="tx1">
+                    <a:lumMod val="85000"/>
+                  </a:schemeClr>
+                </a:solidFill>
+                <a:latin typeface="+mn-lt"/>
+                <a:ea typeface="+mn-ea"/>
+                <a:cs typeface="+mn-cs"/>
+              </a:defRPr>
+            </a:lvl2pPr>
+            <a:lvl3pPr marL="594360" indent="-182880" algn="l" defTabSz="914400" rtl="0" eaLnBrk="1" latinLnBrk="0" hangingPunct="1">
+              <a:spcBef>
+                <a:spcPct val="20000"/>
+              </a:spcBef>
+              <a:buClr>
+                <a:schemeClr val="tx1">
+                  <a:lumMod val="50000"/>
+                  <a:lumOff val="50000"/>
+                </a:schemeClr>
+              </a:buClr>
+              <a:buFont typeface="Wingdings" pitchFamily="2" charset="2"/>
+              <a:buChar char="§"/>
+              <a:defRPr sz="1400" kern="1200">
+                <a:solidFill>
+                  <a:schemeClr val="tx1">
+                    <a:lumMod val="85000"/>
+                  </a:schemeClr>
+                </a:solidFill>
+                <a:latin typeface="+mn-lt"/>
+                <a:ea typeface="+mn-ea"/>
+                <a:cs typeface="+mn-cs"/>
+              </a:defRPr>
+            </a:lvl3pPr>
+            <a:lvl4pPr marL="777240" indent="-182880" algn="l" defTabSz="914400" rtl="0" eaLnBrk="1" latinLnBrk="0" hangingPunct="1">
+              <a:spcBef>
+                <a:spcPct val="20000"/>
+              </a:spcBef>
+              <a:buClr>
+                <a:schemeClr val="tx1">
+                  <a:lumMod val="50000"/>
+                  <a:lumOff val="50000"/>
+                </a:schemeClr>
+              </a:buClr>
+              <a:buFont typeface="Wingdings" pitchFamily="2" charset="2"/>
+              <a:buChar char="§"/>
+              <a:defRPr sz="1400" kern="1200">
+                <a:solidFill>
+                  <a:schemeClr val="tx1">
+                    <a:lumMod val="85000"/>
+                  </a:schemeClr>
+                </a:solidFill>
+                <a:latin typeface="+mn-lt"/>
+                <a:ea typeface="+mn-ea"/>
+                <a:cs typeface="+mn-cs"/>
+              </a:defRPr>
+            </a:lvl4pPr>
+            <a:lvl5pPr marL="960120" indent="-182880" algn="l" defTabSz="914400" rtl="0" eaLnBrk="1" latinLnBrk="0" hangingPunct="1">
+              <a:spcBef>
+                <a:spcPct val="20000"/>
+              </a:spcBef>
+              <a:buClr>
+                <a:schemeClr val="tx1">
+                  <a:lumMod val="50000"/>
+                  <a:lumOff val="50000"/>
+                </a:schemeClr>
+              </a:buClr>
+              <a:buFont typeface="Wingdings" pitchFamily="2" charset="2"/>
+              <a:buChar char="§"/>
+              <a:defRPr sz="1400" kern="1200">
+                <a:solidFill>
+                  <a:schemeClr val="tx1">
+                    <a:lumMod val="85000"/>
+                  </a:schemeClr>
+                </a:solidFill>
+                <a:latin typeface="+mn-lt"/>
+                <a:ea typeface="+mn-ea"/>
+                <a:cs typeface="+mn-cs"/>
+              </a:defRPr>
+            </a:lvl5pPr>
+            <a:lvl6pPr marL="1143000" indent="-182880" algn="l" defTabSz="914400" rtl="0" eaLnBrk="1" latinLnBrk="0" hangingPunct="1">
+              <a:spcBef>
+                <a:spcPts val="288"/>
+              </a:spcBef>
+              <a:buClr>
+                <a:schemeClr val="tx1">
+                  <a:lumMod val="50000"/>
+                  <a:lumOff val="50000"/>
+                </a:schemeClr>
+              </a:buClr>
+              <a:buFont typeface="Wingdings" pitchFamily="2" charset="2"/>
+              <a:buChar char="§"/>
+              <a:defRPr sz="1400" kern="1200" baseline="0">
+                <a:solidFill>
+                  <a:schemeClr val="tx1"/>
+                </a:solidFill>
+                <a:latin typeface="+mn-lt"/>
+                <a:ea typeface="+mn-ea"/>
+                <a:cs typeface="+mn-cs"/>
+              </a:defRPr>
+            </a:lvl6pPr>
+            <a:lvl7pPr marL="1325880" indent="-182880" algn="l" defTabSz="914400" rtl="0" eaLnBrk="1" latinLnBrk="0" hangingPunct="1">
+              <a:spcBef>
+                <a:spcPts val="288"/>
+              </a:spcBef>
+              <a:buClr>
+                <a:schemeClr val="tx1">
+                  <a:lumMod val="50000"/>
+                  <a:lumOff val="50000"/>
+                </a:schemeClr>
+              </a:buClr>
+              <a:buFont typeface="Wingdings" pitchFamily="2" charset="2"/>
+              <a:buChar char="§"/>
+              <a:defRPr sz="1400" kern="1200" baseline="0">
+                <a:solidFill>
+                  <a:schemeClr val="tx1"/>
+                </a:solidFill>
+                <a:latin typeface="+mn-lt"/>
+                <a:ea typeface="+mn-ea"/>
+                <a:cs typeface="+mn-cs"/>
+              </a:defRPr>
+            </a:lvl7pPr>
+            <a:lvl8pPr marL="1508760" indent="-182880" algn="l" defTabSz="914400" rtl="0" eaLnBrk="1" latinLnBrk="0" hangingPunct="1">
+              <a:spcBef>
+                <a:spcPts val="288"/>
+              </a:spcBef>
+              <a:buClr>
+                <a:schemeClr val="tx1">
+                  <a:lumMod val="50000"/>
+                  <a:lumOff val="50000"/>
+                </a:schemeClr>
+              </a:buClr>
+              <a:buFont typeface="Wingdings" pitchFamily="2" charset="2"/>
+              <a:buChar char="§"/>
+              <a:defRPr sz="1400" kern="1200" baseline="0">
+                <a:solidFill>
+                  <a:schemeClr val="tx1"/>
+                </a:solidFill>
+                <a:latin typeface="+mn-lt"/>
+                <a:ea typeface="+mn-ea"/>
+                <a:cs typeface="+mn-cs"/>
+              </a:defRPr>
+            </a:lvl8pPr>
+            <a:lvl9pPr marL="1691640" indent="-182880" algn="l" defTabSz="914400" rtl="0" eaLnBrk="1" latinLnBrk="0" hangingPunct="1">
+              <a:spcBef>
+                <a:spcPts val="288"/>
+              </a:spcBef>
+              <a:buClr>
+                <a:schemeClr val="tx1">
+                  <a:lumMod val="50000"/>
+                  <a:lumOff val="50000"/>
+                </a:schemeClr>
+              </a:buClr>
+              <a:buFont typeface="Wingdings" pitchFamily="2" charset="2"/>
+              <a:buChar char="§"/>
+              <a:defRPr sz="1400" kern="1200" baseline="0">
+                <a:solidFill>
+                  <a:schemeClr val="tx1"/>
+                </a:solidFill>
+                <a:latin typeface="+mn-lt"/>
+                <a:ea typeface="+mn-ea"/>
+                <a:cs typeface="+mn-cs"/>
+              </a:defRPr>
+            </a:lvl9pPr>
+          </a:lstStyle>
+          <a:p>
+            <a:pPr marL="0" indent="0">
+              <a:buNone/>
+            </a:pPr>
+            <a:r>
+              <a:rPr lang="en-GB" sz="3200" dirty="0" smtClean="0"/>
+              <a:t>Extra bits:</a:t>
+            </a:r>
+          </a:p>
+          <a:p>
+            <a:pPr marL="0" indent="0">
+              <a:buNone/>
+            </a:pPr>
+            <a:r>
+              <a:rPr lang="en-GB" sz="3200" dirty="0" smtClean="0">
+                <a:hlinkClick r:id="rId3"/>
+              </a:rPr>
+              <a:t>Accessibility-driver repo on GitHub</a:t>
+            </a:r>
+            <a:r>
+              <a:rPr lang="en-GB" sz="3200" dirty="0" smtClean="0"/>
+              <a:t/>
+            </a:r>
+            <a:br>
+              <a:rPr lang="en-GB" sz="3200" dirty="0" smtClean="0"/>
+            </a:br>
+            <a:r>
+              <a:rPr lang="en-GB" sz="3200" dirty="0" smtClean="0"/>
+              <a:t>(driver that piggybacks on existing journeys)</a:t>
+            </a:r>
+          </a:p>
+          <a:p>
+            <a:pPr marL="0" indent="0">
+              <a:buNone/>
+            </a:pPr>
+            <a:r>
+              <a:rPr lang="en-GB" sz="3200" dirty="0" smtClean="0">
+                <a:hlinkClick r:id="rId4"/>
+              </a:rPr>
+              <a:t>Accessibility-developer-tools wiki on GitHub</a:t>
+            </a:r>
+            <a:endParaRPr lang="en-GB" sz="3200" dirty="0" smtClean="0"/>
+          </a:p>
+          <a:p>
+            <a:pPr marL="0" indent="0">
+              <a:buNone/>
+            </a:pPr>
+            <a:r>
+              <a:rPr lang="en-GB" sz="3200" dirty="0" smtClean="0"/>
+              <a:t>(detailed info about each error type from logs)</a:t>
+            </a:r>
+            <a:endParaRPr lang="en-GB" sz="3200" dirty="0"/>
+          </a:p>
+          <a:p>
+            <a:pPr marL="0" indent="0">
+              <a:buNone/>
+            </a:pPr>
+            <a:endParaRPr lang="en-GB" sz="3200" dirty="0" smtClean="0"/>
+          </a:p>
+          <a:p>
+            <a:pPr marL="0" indent="0">
+              <a:buNone/>
+            </a:pPr>
+            <a:endParaRPr lang="en-GB" sz="3200" dirty="0" smtClean="0"/>
+          </a:p>
+          <a:p>
+            <a:pPr marL="0" indent="0" algn="r">
+              <a:buNone/>
+            </a:pPr>
+            <a:r>
+              <a:rPr lang="en-GB" sz="3200" dirty="0" smtClean="0"/>
+              <a:t>Presenter: Kristaps Melderis</a:t>
+            </a:r>
+          </a:p>
+          <a:p>
+            <a:pPr marL="0" indent="0" algn="r">
+              <a:buNone/>
+            </a:pPr>
+            <a:endParaRPr lang="en-GB" sz="3200" dirty="0"/>
+          </a:p>
+        </p:txBody>
+      </p:sp>
+      <p:sp>
+        <p:nvSpPr>
+          <p:cNvPr id="7" name="Title"/>
+          <p:cNvSpPr>
+            <a:spLocks noGrp="1"/>
+          </p:cNvSpPr>
+          <p:nvPr>
+            <p:ph type="title"/>
+          </p:nvPr>
+        </p:nvSpPr>
+        <p:spPr>
+          <a:xfrm>
+            <a:off x="457200" y="381000"/>
+            <a:ext cx="8001000" cy="609600"/>
+          </a:xfrm>
+        </p:spPr>
+        <p:txBody>
+          <a:bodyPr>
+            <a:noAutofit/>
+          </a:bodyPr>
+          <a:lstStyle/>
+          <a:p>
+            <a:r>
+              <a:rPr lang="en-GB" sz="4000" dirty="0" smtClean="0"/>
+              <a:t>Thank you</a:t>
+            </a:r>
+            <a:endParaRPr lang="en-GB" sz="4000" dirty="0"/>
+          </a:p>
+        </p:txBody>
+      </p:sp>
+    </p:spTree>
+    <p:extLst>
+      <p:ext uri="{BB962C8B-B14F-4D97-AF65-F5344CB8AC3E}">
+        <p14:creationId xmlns:p14="http://schemas.microsoft.com/office/powerpoint/2010/main" val="3111728583"/>
       </p:ext>
     </p:extLst>
   </p:cSld>
@@ -5472,7 +9204,7 @@
       </p:grpSpPr>
       <p:sp>
         <p:nvSpPr>
-          <p:cNvPr id="9" name="Subtitle 2"/>
+          <p:cNvPr id="9" name="Subtitle"/>
           <p:cNvSpPr txBox="1">
             <a:spLocks/>
           </p:cNvSpPr>
@@ -5738,13 +9470,12 @@
               <a:rPr lang="en-GB" sz="3200" dirty="0" smtClean="0"/>
               <a:t> </a:t>
             </a:r>
-            <a:endParaRPr lang="en-GB" sz="3200" dirty="0" smtClean="0"/>
-          </a:p>
-        </p:txBody>
-      </p:sp>
-      <p:sp>
-        <p:nvSpPr>
-          <p:cNvPr id="7" name="Title 6"/>
+          </a:p>
+        </p:txBody>
+      </p:sp>
+      <p:sp>
+        <p:nvSpPr>
+          <p:cNvPr id="7" name="Title"/>
           <p:cNvSpPr>
             <a:spLocks noGrp="1"/>
           </p:cNvSpPr>
@@ -5782,6 +9513,13 @@
   <p:clrMapOvr>
     <a:masterClrMapping/>
   </p:clrMapOvr>
+  <p:timing>
+    <p:tnLst>
+      <p:par>
+        <p:cTn id="1" dur="indefinite" restart="never" nodeType="tmRoot"/>
+      </p:par>
+    </p:tnLst>
+  </p:timing>
 </p:sld>
 </file>
 
@@ -5804,7 +9542,7 @@
       </p:grpSpPr>
       <p:sp>
         <p:nvSpPr>
-          <p:cNvPr id="9" name="Subtitle 2"/>
+          <p:cNvPr id="9" name="Subtitle"/>
           <p:cNvSpPr txBox="1">
             <a:spLocks/>
           </p:cNvSpPr>
@@ -6088,13 +9826,12 @@
               <a:rPr lang="en-GB" sz="3200" dirty="0" smtClean="0"/>
               <a:t> </a:t>
             </a:r>
-            <a:endParaRPr lang="en-GB" sz="3200" dirty="0" smtClean="0"/>
-          </a:p>
-        </p:txBody>
-      </p:sp>
-      <p:sp>
-        <p:nvSpPr>
-          <p:cNvPr id="7" name="Title 6"/>
+          </a:p>
+        </p:txBody>
+      </p:sp>
+      <p:sp>
+        <p:nvSpPr>
+          <p:cNvPr id="7" name="Title"/>
           <p:cNvSpPr>
             <a:spLocks noGrp="1"/>
           </p:cNvSpPr>
@@ -6139,6 +9876,13 @@
   <p:clrMapOvr>
     <a:masterClrMapping/>
   </p:clrMapOvr>
+  <p:timing>
+    <p:tnLst>
+      <p:par>
+        <p:cTn id="1" dur="indefinite" restart="never" nodeType="tmRoot"/>
+      </p:par>
+    </p:tnLst>
+  </p:timing>
 </p:sld>
 </file>
 
@@ -6161,7 +9905,7 @@
       </p:grpSpPr>
       <p:sp>
         <p:nvSpPr>
-          <p:cNvPr id="9" name="Subtitle 2"/>
+          <p:cNvPr id="9" name="Subtitle"/>
           <p:cNvSpPr txBox="1">
             <a:spLocks/>
           </p:cNvSpPr>
@@ -6429,13 +10173,12 @@
               <a:rPr lang="en-GB" sz="3200" dirty="0" smtClean="0"/>
               <a:t> </a:t>
             </a:r>
-            <a:endParaRPr lang="en-GB" sz="3200" dirty="0" smtClean="0"/>
-          </a:p>
-        </p:txBody>
-      </p:sp>
-      <p:sp>
-        <p:nvSpPr>
-          <p:cNvPr id="7" name="Title 6"/>
+          </a:p>
+        </p:txBody>
+      </p:sp>
+      <p:sp>
+        <p:nvSpPr>
+          <p:cNvPr id="7" name="Title"/>
           <p:cNvSpPr>
             <a:spLocks noGrp="1"/>
           </p:cNvSpPr>
@@ -6476,6 +10219,13 @@
   <p:clrMapOvr>
     <a:masterClrMapping/>
   </p:clrMapOvr>
+  <p:timing>
+    <p:tnLst>
+      <p:par>
+        <p:cTn id="1" dur="indefinite" restart="never" nodeType="tmRoot"/>
+      </p:par>
+    </p:tnLst>
+  </p:timing>
 </p:sld>
 </file>
 
@@ -6498,7 +10248,7 @@
       </p:grpSpPr>
       <p:sp>
         <p:nvSpPr>
-          <p:cNvPr id="9" name="Subtitle 2"/>
+          <p:cNvPr id="9" name="Subtitle"/>
           <p:cNvSpPr txBox="1">
             <a:spLocks/>
           </p:cNvSpPr>
@@ -6766,12 +10516,8 @@
               <a:t>Knowledgeable </a:t>
             </a:r>
             <a:r>
-              <a:rPr lang="en-GB" sz="3200" u="sng" dirty="0"/>
-              <a:t>human evaluation is required</a:t>
-            </a:r>
-            <a:r>
               <a:rPr lang="en-GB" sz="3200" dirty="0"/>
-              <a:t> to determine if a site is accessible.</a:t>
+              <a:t>human evaluation is required to determine if a site is accessible.</a:t>
             </a:r>
             <a:endParaRPr lang="en-GB" sz="3200" dirty="0" smtClean="0"/>
           </a:p>
@@ -6795,13 +10541,12 @@
               <a:rPr lang="en-GB" sz="3200" dirty="0" smtClean="0"/>
               <a:t> </a:t>
             </a:r>
-            <a:endParaRPr lang="en-GB" sz="3200" dirty="0" smtClean="0"/>
-          </a:p>
-        </p:txBody>
-      </p:sp>
-      <p:sp>
-        <p:nvSpPr>
-          <p:cNvPr id="7" name="Title 6"/>
+          </a:p>
+        </p:txBody>
+      </p:sp>
+      <p:sp>
+        <p:nvSpPr>
+          <p:cNvPr id="7" name="Title"/>
           <p:cNvSpPr>
             <a:spLocks noGrp="1"/>
           </p:cNvSpPr>
@@ -6862,242 +10607,50 @@
           <a:chExt cx="0" cy="0"/>
         </a:xfrm>
       </p:grpSpPr>
-      <p:sp>
-        <p:nvSpPr>
-          <p:cNvPr id="9" name="Subtitle 2"/>
-          <p:cNvSpPr txBox="1">
-            <a:spLocks/>
-          </p:cNvSpPr>
+      <p:pic>
+        <p:nvPicPr>
+          <p:cNvPr id="1026" name="Picture" descr="Image displays coverage and responsibility of each tool in this test automation example. As well as giving high level view of approximate process flow." title="Accessibility test automation example process as image"/>
+          <p:cNvPicPr>
+            <a:picLocks noChangeAspect="1" noChangeArrowheads="1"/>
+          </p:cNvPicPr>
           <p:nvPr/>
-        </p:nvSpPr>
-        <p:spPr>
+        </p:nvPicPr>
+        <p:blipFill>
+          <a:blip r:embed="rId3">
+            <a:extLst>
+              <a:ext uri="{28A0092B-C50C-407E-A947-70E740481C1C}">
+                <a14:useLocalDpi xmlns:a14="http://schemas.microsoft.com/office/drawing/2010/main" val="0"/>
+              </a:ext>
+            </a:extLst>
+          </a:blip>
+          <a:srcRect/>
+          <a:stretch>
+            <a:fillRect/>
+          </a:stretch>
+        </p:blipFill>
+        <p:spPr bwMode="auto">
           <a:xfrm>
-            <a:off x="533400" y="1066800"/>
-            <a:ext cx="7848600" cy="4724400"/>
+            <a:off x="631825" y="914400"/>
+            <a:ext cx="7651750" cy="5632450"/>
           </a:xfrm>
           <a:prstGeom prst="rect">
             <a:avLst/>
           </a:prstGeom>
+          <a:noFill/>
+          <a:extLst>
+            <a:ext uri="{909E8E84-426E-40DD-AFC4-6F175D3DCCD1}">
+              <a14:hiddenFill xmlns:a14="http://schemas.microsoft.com/office/drawing/2010/main">
+                <a:solidFill>
+                  <a:srgbClr val="FFFFFF"/>
+                </a:solidFill>
+              </a14:hiddenFill>
+            </a:ext>
+          </a:extLst>
         </p:spPr>
-        <p:txBody>
-          <a:bodyPr vert="horz" lIns="91440" tIns="45720" rIns="91440" bIns="45720" rtlCol="0" anchor="ctr">
-            <a:normAutofit/>
-          </a:bodyPr>
-          <a:lstStyle>
-            <a:lvl1pPr marL="182880" indent="-182880" algn="l" defTabSz="914400" rtl="0" eaLnBrk="1" latinLnBrk="0" hangingPunct="1">
-              <a:spcBef>
-                <a:spcPct val="20000"/>
-              </a:spcBef>
-              <a:buClr>
-                <a:schemeClr val="tx1">
-                  <a:lumMod val="50000"/>
-                  <a:lumOff val="50000"/>
-                </a:schemeClr>
-              </a:buClr>
-              <a:buFont typeface="Wingdings" pitchFamily="2" charset="2"/>
-              <a:buChar char="§"/>
-              <a:defRPr sz="1800" kern="1200">
-                <a:solidFill>
-                  <a:schemeClr val="tx1">
-                    <a:lumMod val="85000"/>
-                  </a:schemeClr>
-                </a:solidFill>
-                <a:latin typeface="+mn-lt"/>
-                <a:ea typeface="+mn-ea"/>
-                <a:cs typeface="+mn-cs"/>
-              </a:defRPr>
-            </a:lvl1pPr>
-            <a:lvl2pPr marL="411480" indent="-182880" algn="l" defTabSz="914400" rtl="0" eaLnBrk="1" latinLnBrk="0" hangingPunct="1">
-              <a:spcBef>
-                <a:spcPct val="20000"/>
-              </a:spcBef>
-              <a:buClr>
-                <a:schemeClr val="tx1">
-                  <a:lumMod val="50000"/>
-                  <a:lumOff val="50000"/>
-                </a:schemeClr>
-              </a:buClr>
-              <a:buFont typeface="Wingdings" pitchFamily="2" charset="2"/>
-              <a:buChar char="§"/>
-              <a:defRPr sz="1400" kern="1200">
-                <a:solidFill>
-                  <a:schemeClr val="tx1">
-                    <a:lumMod val="85000"/>
-                  </a:schemeClr>
-                </a:solidFill>
-                <a:latin typeface="+mn-lt"/>
-                <a:ea typeface="+mn-ea"/>
-                <a:cs typeface="+mn-cs"/>
-              </a:defRPr>
-            </a:lvl2pPr>
-            <a:lvl3pPr marL="594360" indent="-182880" algn="l" defTabSz="914400" rtl="0" eaLnBrk="1" latinLnBrk="0" hangingPunct="1">
-              <a:spcBef>
-                <a:spcPct val="20000"/>
-              </a:spcBef>
-              <a:buClr>
-                <a:schemeClr val="tx1">
-                  <a:lumMod val="50000"/>
-                  <a:lumOff val="50000"/>
-                </a:schemeClr>
-              </a:buClr>
-              <a:buFont typeface="Wingdings" pitchFamily="2" charset="2"/>
-              <a:buChar char="§"/>
-              <a:defRPr sz="1400" kern="1200">
-                <a:solidFill>
-                  <a:schemeClr val="tx1">
-                    <a:lumMod val="85000"/>
-                  </a:schemeClr>
-                </a:solidFill>
-                <a:latin typeface="+mn-lt"/>
-                <a:ea typeface="+mn-ea"/>
-                <a:cs typeface="+mn-cs"/>
-              </a:defRPr>
-            </a:lvl3pPr>
-            <a:lvl4pPr marL="777240" indent="-182880" algn="l" defTabSz="914400" rtl="0" eaLnBrk="1" latinLnBrk="0" hangingPunct="1">
-              <a:spcBef>
-                <a:spcPct val="20000"/>
-              </a:spcBef>
-              <a:buClr>
-                <a:schemeClr val="tx1">
-                  <a:lumMod val="50000"/>
-                  <a:lumOff val="50000"/>
-                </a:schemeClr>
-              </a:buClr>
-              <a:buFont typeface="Wingdings" pitchFamily="2" charset="2"/>
-              <a:buChar char="§"/>
-              <a:defRPr sz="1400" kern="1200">
-                <a:solidFill>
-                  <a:schemeClr val="tx1">
-                    <a:lumMod val="85000"/>
-                  </a:schemeClr>
-                </a:solidFill>
-                <a:latin typeface="+mn-lt"/>
-                <a:ea typeface="+mn-ea"/>
-                <a:cs typeface="+mn-cs"/>
-              </a:defRPr>
-            </a:lvl4pPr>
-            <a:lvl5pPr marL="960120" indent="-182880" algn="l" defTabSz="914400" rtl="0" eaLnBrk="1" latinLnBrk="0" hangingPunct="1">
-              <a:spcBef>
-                <a:spcPct val="20000"/>
-              </a:spcBef>
-              <a:buClr>
-                <a:schemeClr val="tx1">
-                  <a:lumMod val="50000"/>
-                  <a:lumOff val="50000"/>
-                </a:schemeClr>
-              </a:buClr>
-              <a:buFont typeface="Wingdings" pitchFamily="2" charset="2"/>
-              <a:buChar char="§"/>
-              <a:defRPr sz="1400" kern="1200">
-                <a:solidFill>
-                  <a:schemeClr val="tx1">
-                    <a:lumMod val="85000"/>
-                  </a:schemeClr>
-                </a:solidFill>
-                <a:latin typeface="+mn-lt"/>
-                <a:ea typeface="+mn-ea"/>
-                <a:cs typeface="+mn-cs"/>
-              </a:defRPr>
-            </a:lvl5pPr>
-            <a:lvl6pPr marL="1143000" indent="-182880" algn="l" defTabSz="914400" rtl="0" eaLnBrk="1" latinLnBrk="0" hangingPunct="1">
-              <a:spcBef>
-                <a:spcPts val="288"/>
-              </a:spcBef>
-              <a:buClr>
-                <a:schemeClr val="tx1">
-                  <a:lumMod val="50000"/>
-                  <a:lumOff val="50000"/>
-                </a:schemeClr>
-              </a:buClr>
-              <a:buFont typeface="Wingdings" pitchFamily="2" charset="2"/>
-              <a:buChar char="§"/>
-              <a:defRPr sz="1400" kern="1200" baseline="0">
-                <a:solidFill>
-                  <a:schemeClr val="tx1"/>
-                </a:solidFill>
-                <a:latin typeface="+mn-lt"/>
-                <a:ea typeface="+mn-ea"/>
-                <a:cs typeface="+mn-cs"/>
-              </a:defRPr>
-            </a:lvl6pPr>
-            <a:lvl7pPr marL="1325880" indent="-182880" algn="l" defTabSz="914400" rtl="0" eaLnBrk="1" latinLnBrk="0" hangingPunct="1">
-              <a:spcBef>
-                <a:spcPts val="288"/>
-              </a:spcBef>
-              <a:buClr>
-                <a:schemeClr val="tx1">
-                  <a:lumMod val="50000"/>
-                  <a:lumOff val="50000"/>
-                </a:schemeClr>
-              </a:buClr>
-              <a:buFont typeface="Wingdings" pitchFamily="2" charset="2"/>
-              <a:buChar char="§"/>
-              <a:defRPr sz="1400" kern="1200" baseline="0">
-                <a:solidFill>
-                  <a:schemeClr val="tx1"/>
-                </a:solidFill>
-                <a:latin typeface="+mn-lt"/>
-                <a:ea typeface="+mn-ea"/>
-                <a:cs typeface="+mn-cs"/>
-              </a:defRPr>
-            </a:lvl7pPr>
-            <a:lvl8pPr marL="1508760" indent="-182880" algn="l" defTabSz="914400" rtl="0" eaLnBrk="1" latinLnBrk="0" hangingPunct="1">
-              <a:spcBef>
-                <a:spcPts val="288"/>
-              </a:spcBef>
-              <a:buClr>
-                <a:schemeClr val="tx1">
-                  <a:lumMod val="50000"/>
-                  <a:lumOff val="50000"/>
-                </a:schemeClr>
-              </a:buClr>
-              <a:buFont typeface="Wingdings" pitchFamily="2" charset="2"/>
-              <a:buChar char="§"/>
-              <a:defRPr sz="1400" kern="1200" baseline="0">
-                <a:solidFill>
-                  <a:schemeClr val="tx1"/>
-                </a:solidFill>
-                <a:latin typeface="+mn-lt"/>
-                <a:ea typeface="+mn-ea"/>
-                <a:cs typeface="+mn-cs"/>
-              </a:defRPr>
-            </a:lvl8pPr>
-            <a:lvl9pPr marL="1691640" indent="-182880" algn="l" defTabSz="914400" rtl="0" eaLnBrk="1" latinLnBrk="0" hangingPunct="1">
-              <a:spcBef>
-                <a:spcPts val="288"/>
-              </a:spcBef>
-              <a:buClr>
-                <a:schemeClr val="tx1">
-                  <a:lumMod val="50000"/>
-                  <a:lumOff val="50000"/>
-                </a:schemeClr>
-              </a:buClr>
-              <a:buFont typeface="Wingdings" pitchFamily="2" charset="2"/>
-              <a:buChar char="§"/>
-              <a:defRPr sz="1400" kern="1200" baseline="0">
-                <a:solidFill>
-                  <a:schemeClr val="tx1"/>
-                </a:solidFill>
-                <a:latin typeface="+mn-lt"/>
-                <a:ea typeface="+mn-ea"/>
-                <a:cs typeface="+mn-cs"/>
-              </a:defRPr>
-            </a:lvl9pPr>
-          </a:lstStyle>
-          <a:p>
-            <a:pPr marL="0" indent="0">
-              <a:buNone/>
-            </a:pPr>
-            <a:r>
-              <a:rPr lang="en-GB" sz="3200" dirty="0" smtClean="0"/>
-              <a:t>&lt;high level process as image&gt; WIP</a:t>
-            </a:r>
-          </a:p>
-        </p:txBody>
-      </p:sp>
-      <p:sp>
-        <p:nvSpPr>
-          <p:cNvPr id="7" name="Title 6"/>
+      </p:pic>
+      <p:sp>
+        <p:nvSpPr>
+          <p:cNvPr id="7" name="Title"/>
           <p:cNvSpPr>
             <a:spLocks noGrp="1"/>
           </p:cNvSpPr>
@@ -7157,7 +10710,7 @@
       </p:grpSpPr>
       <p:sp>
         <p:nvSpPr>
-          <p:cNvPr id="9" name="Subtitle 2"/>
+          <p:cNvPr id="9" name="Subtitle"/>
           <p:cNvSpPr txBox="1">
             <a:spLocks/>
           </p:cNvSpPr>
@@ -7383,8 +10936,12 @@
               <a:buChar char="-"/>
             </a:pPr>
             <a:r>
+              <a:rPr lang="en-GB" sz="3200" dirty="0" smtClean="0"/>
+              <a:t>ADT </a:t>
+            </a:r>
+            <a:r>
               <a:rPr lang="en-GB" sz="3200" dirty="0"/>
-              <a:t>Accessibility-developer-tools (</a:t>
+              <a:t>(</a:t>
             </a:r>
             <a:r>
               <a:rPr lang="en-GB" sz="3200" dirty="0">
@@ -7465,7 +11022,7 @@
       </p:sp>
       <p:sp>
         <p:nvSpPr>
-          <p:cNvPr id="7" name="Title 6"/>
+          <p:cNvPr id="7" name="Title"/>
           <p:cNvSpPr>
             <a:spLocks noGrp="1"/>
           </p:cNvSpPr>
@@ -7525,7 +11082,7 @@
       </p:grpSpPr>
       <p:sp>
         <p:nvSpPr>
-          <p:cNvPr id="9" name="Subtitle 2"/>
+          <p:cNvPr id="9" name="Subtitle"/>
           <p:cNvSpPr txBox="1">
             <a:spLocks/>
           </p:cNvSpPr>
@@ -7776,7 +11333,7 @@
             </a:pPr>
             <a:r>
               <a:rPr lang="en-GB" sz="3200" dirty="0" smtClean="0"/>
-              <a:t>The library from the project is compiled into a single executable JavaScript file:</a:t>
+              <a:t>The library and utility code from the project is compiled into a single executable JavaScript file:</a:t>
             </a:r>
             <a:endParaRPr lang="en-GB" sz="3200" dirty="0"/>
           </a:p>
@@ -7813,7 +11370,7 @@
       </p:sp>
       <p:sp>
         <p:nvSpPr>
-          <p:cNvPr id="7" name="Title 6"/>
+          <p:cNvPr id="7" name="Title"/>
           <p:cNvSpPr>
             <a:spLocks noGrp="1"/>
           </p:cNvSpPr>
@@ -7880,7 +11437,7 @@
       </p:grpSpPr>
       <p:sp>
         <p:nvSpPr>
-          <p:cNvPr id="9" name="Subtitle 2"/>
+          <p:cNvPr id="9" name="Subtitle"/>
           <p:cNvSpPr txBox="1">
             <a:spLocks/>
           </p:cNvSpPr>
@@ -8106,15 +11663,7 @@
             </a:pPr>
             <a:r>
               <a:rPr lang="en-GB" sz="3200" dirty="0" smtClean="0"/>
-              <a:t>Our “tests” is a library of audit rules that can be executed as a JavaScript.</a:t>
-            </a:r>
-            <a:r>
-              <a:rPr lang="en-GB" sz="3200" dirty="0"/>
-              <a:t> </a:t>
-            </a:r>
-            <a:r>
-              <a:rPr lang="en-GB" sz="3200" dirty="0" smtClean="0"/>
-              <a:t>We need a mechanism for executing JavaScript.</a:t>
+              <a:t>We use a library of audit rules compiled into a single JavaScript. From Selenium we need a mechanism for executing JavaScript.</a:t>
             </a:r>
           </a:p>
           <a:p>
@@ -8163,7 +11712,7 @@
       </p:sp>
       <p:sp>
         <p:nvSpPr>
-          <p:cNvPr id="7" name="Title 6"/>
+          <p:cNvPr id="7" name="Title"/>
           <p:cNvSpPr>
             <a:spLocks noGrp="1"/>
           </p:cNvSpPr>

</xml_diff>